<commit_message>
update pics of static proxy
</commit_message>
<xml_diff>
--- a/Reflection & Proxy/代理模式.pptx
+++ b/Reflection & Proxy/代理模式.pptx
@@ -8,9 +8,12 @@
     <p:sldId id="256" r:id="rId2"/>
     <p:sldId id="260" r:id="rId3"/>
     <p:sldId id="261" r:id="rId4"/>
-    <p:sldId id="257" r:id="rId5"/>
-    <p:sldId id="258" r:id="rId6"/>
-    <p:sldId id="259" r:id="rId7"/>
+    <p:sldId id="262" r:id="rId5"/>
+    <p:sldId id="263" r:id="rId6"/>
+    <p:sldId id="264" r:id="rId7"/>
+    <p:sldId id="257" r:id="rId8"/>
+    <p:sldId id="258" r:id="rId9"/>
+    <p:sldId id="259" r:id="rId10"/>
   </p:sldIdLst>
   <p:sldSz cx="12192000" cy="6858000"/>
   <p:notesSz cx="6858000" cy="9144000"/>
@@ -248,7 +251,7 @@
           <a:p>
             <a:fld id="{CA3E1685-E682-4FB0-985A-A9B25B9EC5DA}" type="datetimeFigureOut">
               <a:rPr lang="zh-CN" altLang="en-US" smtClean="0"/>
-              <a:t>2017/8/21</a:t>
+              <a:t>2017/8/25</a:t>
             </a:fld>
             <a:endParaRPr lang="zh-CN" altLang="en-US"/>
           </a:p>
@@ -418,7 +421,7 @@
           <a:p>
             <a:fld id="{CA3E1685-E682-4FB0-985A-A9B25B9EC5DA}" type="datetimeFigureOut">
               <a:rPr lang="zh-CN" altLang="en-US" smtClean="0"/>
-              <a:t>2017/8/21</a:t>
+              <a:t>2017/8/25</a:t>
             </a:fld>
             <a:endParaRPr lang="zh-CN" altLang="en-US"/>
           </a:p>
@@ -598,7 +601,7 @@
           <a:p>
             <a:fld id="{CA3E1685-E682-4FB0-985A-A9B25B9EC5DA}" type="datetimeFigureOut">
               <a:rPr lang="zh-CN" altLang="en-US" smtClean="0"/>
-              <a:t>2017/8/21</a:t>
+              <a:t>2017/8/25</a:t>
             </a:fld>
             <a:endParaRPr lang="zh-CN" altLang="en-US"/>
           </a:p>
@@ -768,7 +771,7 @@
           <a:p>
             <a:fld id="{CA3E1685-E682-4FB0-985A-A9B25B9EC5DA}" type="datetimeFigureOut">
               <a:rPr lang="zh-CN" altLang="en-US" smtClean="0"/>
-              <a:t>2017/8/21</a:t>
+              <a:t>2017/8/25</a:t>
             </a:fld>
             <a:endParaRPr lang="zh-CN" altLang="en-US"/>
           </a:p>
@@ -1014,7 +1017,7 @@
           <a:p>
             <a:fld id="{CA3E1685-E682-4FB0-985A-A9B25B9EC5DA}" type="datetimeFigureOut">
               <a:rPr lang="zh-CN" altLang="en-US" smtClean="0"/>
-              <a:t>2017/8/21</a:t>
+              <a:t>2017/8/25</a:t>
             </a:fld>
             <a:endParaRPr lang="zh-CN" altLang="en-US"/>
           </a:p>
@@ -1246,7 +1249,7 @@
           <a:p>
             <a:fld id="{CA3E1685-E682-4FB0-985A-A9B25B9EC5DA}" type="datetimeFigureOut">
               <a:rPr lang="zh-CN" altLang="en-US" smtClean="0"/>
-              <a:t>2017/8/21</a:t>
+              <a:t>2017/8/25</a:t>
             </a:fld>
             <a:endParaRPr lang="zh-CN" altLang="en-US"/>
           </a:p>
@@ -1613,7 +1616,7 @@
           <a:p>
             <a:fld id="{CA3E1685-E682-4FB0-985A-A9B25B9EC5DA}" type="datetimeFigureOut">
               <a:rPr lang="zh-CN" altLang="en-US" smtClean="0"/>
-              <a:t>2017/8/21</a:t>
+              <a:t>2017/8/25</a:t>
             </a:fld>
             <a:endParaRPr lang="zh-CN" altLang="en-US"/>
           </a:p>
@@ -1731,7 +1734,7 @@
           <a:p>
             <a:fld id="{CA3E1685-E682-4FB0-985A-A9B25B9EC5DA}" type="datetimeFigureOut">
               <a:rPr lang="zh-CN" altLang="en-US" smtClean="0"/>
-              <a:t>2017/8/21</a:t>
+              <a:t>2017/8/25</a:t>
             </a:fld>
             <a:endParaRPr lang="zh-CN" altLang="en-US"/>
           </a:p>
@@ -1826,7 +1829,7 @@
           <a:p>
             <a:fld id="{CA3E1685-E682-4FB0-985A-A9B25B9EC5DA}" type="datetimeFigureOut">
               <a:rPr lang="zh-CN" altLang="en-US" smtClean="0"/>
-              <a:t>2017/8/21</a:t>
+              <a:t>2017/8/25</a:t>
             </a:fld>
             <a:endParaRPr lang="zh-CN" altLang="en-US"/>
           </a:p>
@@ -2103,7 +2106,7 @@
           <a:p>
             <a:fld id="{CA3E1685-E682-4FB0-985A-A9B25B9EC5DA}" type="datetimeFigureOut">
               <a:rPr lang="zh-CN" altLang="en-US" smtClean="0"/>
-              <a:t>2017/8/21</a:t>
+              <a:t>2017/8/25</a:t>
             </a:fld>
             <a:endParaRPr lang="zh-CN" altLang="en-US"/>
           </a:p>
@@ -2356,7 +2359,7 @@
           <a:p>
             <a:fld id="{CA3E1685-E682-4FB0-985A-A9B25B9EC5DA}" type="datetimeFigureOut">
               <a:rPr lang="zh-CN" altLang="en-US" smtClean="0"/>
-              <a:t>2017/8/21</a:t>
+              <a:t>2017/8/25</a:t>
             </a:fld>
             <a:endParaRPr lang="zh-CN" altLang="en-US"/>
           </a:p>
@@ -2569,7 +2572,7 @@
           <a:p>
             <a:fld id="{CA3E1685-E682-4FB0-985A-A9B25B9EC5DA}" type="datetimeFigureOut">
               <a:rPr lang="zh-CN" altLang="en-US" smtClean="0"/>
-              <a:t>2017/8/21</a:t>
+              <a:t>2017/8/25</a:t>
             </a:fld>
             <a:endParaRPr lang="zh-CN" altLang="en-US"/>
           </a:p>
@@ -5823,24 +5826,22 @@
         </p:nvSpPr>
         <p:spPr>
           <a:xfrm>
-            <a:off x="5975683" y="416092"/>
-            <a:ext cx="2053389" cy="794084"/>
+            <a:off x="1498431" y="1092425"/>
+            <a:ext cx="2206794" cy="1000525"/>
           </a:xfrm>
           <a:prstGeom prst="roundRect">
             <a:avLst/>
           </a:prstGeom>
         </p:spPr>
         <p:style>
-          <a:lnRef idx="2">
-            <a:schemeClr val="accent2">
-              <a:shade val="50000"/>
-            </a:schemeClr>
+          <a:lnRef idx="0">
+            <a:schemeClr val="accent1"/>
           </a:lnRef>
-          <a:fillRef idx="1">
-            <a:schemeClr val="accent2"/>
+          <a:fillRef idx="3">
+            <a:schemeClr val="accent1"/>
           </a:fillRef>
-          <a:effectRef idx="0">
-            <a:schemeClr val="accent2"/>
+          <a:effectRef idx="3">
+            <a:schemeClr val="accent1"/>
           </a:effectRef>
           <a:fontRef idx="minor">
             <a:schemeClr val="lt1"/>
@@ -5852,46 +5853,112 @@
           <a:p>
             <a:pPr algn="ctr"/>
             <a:r>
-              <a:rPr lang="en-US" altLang="zh-CN" dirty="0" smtClean="0"/>
-              <a:t>Proxy</a:t>
-            </a:r>
-          </a:p>
-          <a:p>
-            <a:pPr algn="ctr"/>
-            <a:r>
-              <a:rPr lang="en-US" altLang="zh-CN" dirty="0" smtClean="0"/>
-              <a:t>.newProxyInstace()</a:t>
-            </a:r>
-            <a:endParaRPr lang="zh-CN" altLang="en-US" dirty="0"/>
-          </a:p>
-        </p:txBody>
-      </p:sp>
-      <p:sp>
-        <p:nvSpPr>
-          <p:cNvPr id="5" name="圆角矩形 4"/>
+              <a:rPr lang="en-US" altLang="zh-CN" sz="1400" dirty="0" smtClean="0">
+                <a:solidFill>
+                  <a:schemeClr val="tx1">
+                    <a:lumMod val="95000"/>
+                    <a:lumOff val="5000"/>
+                  </a:schemeClr>
+                </a:solidFill>
+              </a:rPr>
+              <a:t>&lt;&lt;interface&gt;&gt;</a:t>
+            </a:r>
+          </a:p>
+          <a:p>
+            <a:pPr algn="ctr"/>
+            <a:r>
+              <a:rPr lang="en-US" altLang="zh-CN" sz="1400" dirty="0" smtClean="0">
+                <a:solidFill>
+                  <a:schemeClr val="tx1">
+                    <a:lumMod val="95000"/>
+                    <a:lumOff val="5000"/>
+                  </a:schemeClr>
+                </a:solidFill>
+              </a:rPr>
+              <a:t>WealthManagement</a:t>
+            </a:r>
+            <a:endParaRPr lang="en-US" altLang="zh-CN" sz="1400" dirty="0">
+              <a:solidFill>
+                <a:schemeClr val="tx1">
+                  <a:lumMod val="95000"/>
+                  <a:lumOff val="5000"/>
+                </a:schemeClr>
+              </a:solidFill>
+            </a:endParaRPr>
+          </a:p>
+          <a:p>
+            <a:pPr algn="ctr"/>
+            <a:r>
+              <a:rPr lang="en-US" altLang="zh-CN" sz="1400" dirty="0" smtClean="0">
+                <a:solidFill>
+                  <a:schemeClr val="tx1">
+                    <a:lumMod val="95000"/>
+                    <a:lumOff val="5000"/>
+                  </a:schemeClr>
+                </a:solidFill>
+              </a:rPr>
+              <a:t>pay()</a:t>
+            </a:r>
+          </a:p>
+          <a:p>
+            <a:pPr algn="ctr"/>
+            <a:r>
+              <a:rPr lang="en-US" altLang="zh-CN" sz="1400" dirty="0">
+                <a:solidFill>
+                  <a:schemeClr val="tx1">
+                    <a:lumMod val="95000"/>
+                    <a:lumOff val="5000"/>
+                  </a:schemeClr>
+                </a:solidFill>
+              </a:rPr>
+              <a:t>g</a:t>
+            </a:r>
+            <a:r>
+              <a:rPr lang="en-US" altLang="zh-CN" sz="1400" dirty="0" smtClean="0">
+                <a:solidFill>
+                  <a:schemeClr val="tx1">
+                    <a:lumMod val="95000"/>
+                    <a:lumOff val="5000"/>
+                  </a:schemeClr>
+                </a:solidFill>
+              </a:rPr>
+              <a:t>athering()</a:t>
+            </a:r>
+            <a:endParaRPr lang="zh-CN" altLang="en-US" sz="1400" dirty="0">
+              <a:solidFill>
+                <a:schemeClr val="tx1">
+                  <a:lumMod val="95000"/>
+                  <a:lumOff val="5000"/>
+                </a:schemeClr>
+              </a:solidFill>
+            </a:endParaRPr>
+          </a:p>
+        </p:txBody>
+      </p:sp>
+      <p:sp>
+        <p:nvSpPr>
+          <p:cNvPr id="5" name="矩形 4"/>
           <p:cNvSpPr/>
           <p:nvPr/>
         </p:nvSpPr>
         <p:spPr>
           <a:xfrm>
-            <a:off x="2598822" y="397041"/>
-            <a:ext cx="2053388" cy="794084"/>
-          </a:xfrm>
-          <a:prstGeom prst="roundRect">
+            <a:off x="336884" y="3539099"/>
+            <a:ext cx="1796716" cy="794085"/>
+          </a:xfrm>
+          <a:prstGeom prst="rect">
             <a:avLst/>
           </a:prstGeom>
         </p:spPr>
         <p:style>
-          <a:lnRef idx="2">
-            <a:schemeClr val="accent2">
-              <a:shade val="50000"/>
-            </a:schemeClr>
+          <a:lnRef idx="0">
+            <a:schemeClr val="accent6"/>
           </a:lnRef>
-          <a:fillRef idx="1">
-            <a:schemeClr val="accent2"/>
+          <a:fillRef idx="3">
+            <a:schemeClr val="accent6"/>
           </a:fillRef>
-          <a:effectRef idx="0">
-            <a:schemeClr val="accent2"/>
+          <a:effectRef idx="3">
+            <a:schemeClr val="accent6"/>
           </a:effectRef>
           <a:fontRef idx="minor">
             <a:schemeClr val="lt1"/>
@@ -5903,46 +5970,87 @@
           <a:p>
             <a:pPr algn="ctr"/>
             <a:r>
-              <a:rPr lang="en-US" altLang="zh-CN" dirty="0" smtClean="0"/>
-              <a:t>cons</a:t>
-            </a:r>
-          </a:p>
-          <a:p>
-            <a:pPr algn="ctr"/>
-            <a:r>
-              <a:rPr lang="en-US" altLang="zh-CN" dirty="0" smtClean="0"/>
-              <a:t>.newInstance(h)</a:t>
-            </a:r>
-            <a:endParaRPr lang="zh-CN" altLang="en-US" dirty="0"/>
-          </a:p>
-        </p:txBody>
-      </p:sp>
-      <p:sp>
-        <p:nvSpPr>
-          <p:cNvPr id="6" name="圆角矩形 5"/>
+              <a:rPr lang="en-US" altLang="zh-CN" sz="1600" b="1" dirty="0" smtClean="0">
+                <a:solidFill>
+                  <a:schemeClr val="tx1">
+                    <a:lumMod val="95000"/>
+                    <a:lumOff val="5000"/>
+                  </a:schemeClr>
+                </a:solidFill>
+              </a:rPr>
+              <a:t>Bank</a:t>
+            </a:r>
+            <a:endParaRPr lang="en-US" altLang="zh-CN" sz="1600" b="1" dirty="0">
+              <a:solidFill>
+                <a:schemeClr val="tx1">
+                  <a:lumMod val="95000"/>
+                  <a:lumOff val="5000"/>
+                </a:schemeClr>
+              </a:solidFill>
+            </a:endParaRPr>
+          </a:p>
+          <a:p>
+            <a:pPr algn="ctr"/>
+            <a:r>
+              <a:rPr lang="en-US" altLang="zh-CN" sz="1600" b="1" dirty="0">
+                <a:solidFill>
+                  <a:schemeClr val="tx1">
+                    <a:lumMod val="95000"/>
+                    <a:lumOff val="5000"/>
+                  </a:schemeClr>
+                </a:solidFill>
+              </a:rPr>
+              <a:t>pay()</a:t>
+            </a:r>
+          </a:p>
+          <a:p>
+            <a:pPr algn="ctr"/>
+            <a:r>
+              <a:rPr lang="en-US" altLang="zh-CN" sz="1600" b="1" dirty="0">
+                <a:solidFill>
+                  <a:schemeClr val="tx1">
+                    <a:lumMod val="95000"/>
+                    <a:lumOff val="5000"/>
+                  </a:schemeClr>
+                </a:solidFill>
+              </a:rPr>
+              <a:t>gathering()</a:t>
+            </a:r>
+            <a:endParaRPr lang="zh-CN" altLang="en-US" sz="1600" b="1" dirty="0">
+              <a:solidFill>
+                <a:schemeClr val="tx1">
+                  <a:lumMod val="95000"/>
+                  <a:lumOff val="5000"/>
+                </a:schemeClr>
+              </a:solidFill>
+            </a:endParaRPr>
+          </a:p>
+        </p:txBody>
+      </p:sp>
+      <p:sp>
+        <p:nvSpPr>
+          <p:cNvPr id="6" name="矩形 5"/>
           <p:cNvSpPr/>
           <p:nvPr/>
         </p:nvSpPr>
         <p:spPr>
           <a:xfrm>
-            <a:off x="9649326" y="416092"/>
-            <a:ext cx="2053388" cy="794084"/>
-          </a:xfrm>
-          <a:prstGeom prst="roundRect">
+            <a:off x="3070057" y="3511388"/>
+            <a:ext cx="1796716" cy="821796"/>
+          </a:xfrm>
+          <a:prstGeom prst="rect">
             <a:avLst/>
           </a:prstGeom>
         </p:spPr>
         <p:style>
-          <a:lnRef idx="2">
-            <a:schemeClr val="accent1">
-              <a:shade val="50000"/>
-            </a:schemeClr>
+          <a:lnRef idx="0">
+            <a:schemeClr val="accent4"/>
           </a:lnRef>
-          <a:fillRef idx="1">
-            <a:schemeClr val="accent1"/>
+          <a:fillRef idx="3">
+            <a:schemeClr val="accent4"/>
           </a:fillRef>
-          <a:effectRef idx="0">
-            <a:schemeClr val="accent1"/>
+          <a:effectRef idx="3">
+            <a:schemeClr val="accent4"/>
           </a:effectRef>
           <a:fontRef idx="minor">
             <a:schemeClr val="lt1"/>
@@ -5953,275 +6061,105 @@
           <a:lstStyle/>
           <a:p>
             <a:pPr algn="ctr"/>
-            <a:r>
-              <a:rPr lang="en-US" altLang="zh-CN" dirty="0" smtClean="0"/>
-              <a:t>$Proxy0</a:t>
-            </a:r>
-            <a:r>
-              <a:rPr lang="zh-CN" altLang="en-US" dirty="0" smtClean="0"/>
-              <a:t>对象</a:t>
-            </a:r>
-            <a:endParaRPr lang="zh-CN" altLang="en-US" dirty="0"/>
-          </a:p>
-        </p:txBody>
-      </p:sp>
-      <p:sp>
-        <p:nvSpPr>
-          <p:cNvPr id="7" name="圆角矩形 6"/>
-          <p:cNvSpPr/>
-          <p:nvPr/>
-        </p:nvSpPr>
-        <p:spPr>
-          <a:xfrm>
-            <a:off x="2590801" y="5654845"/>
-            <a:ext cx="2053388" cy="794084"/>
-          </a:xfrm>
-          <a:prstGeom prst="roundRect">
-            <a:avLst/>
-          </a:prstGeom>
-        </p:spPr>
-        <p:style>
-          <a:lnRef idx="2">
-            <a:schemeClr val="accent2">
-              <a:shade val="50000"/>
-            </a:schemeClr>
-          </a:lnRef>
-          <a:fillRef idx="1">
-            <a:schemeClr val="accent2"/>
-          </a:fillRef>
-          <a:effectRef idx="0">
-            <a:schemeClr val="accent2"/>
-          </a:effectRef>
-          <a:fontRef idx="minor">
-            <a:schemeClr val="lt1"/>
-          </a:fontRef>
-        </p:style>
-        <p:txBody>
-          <a:bodyPr rtlCol="0" anchor="ctr"/>
-          <a:lstStyle/>
-          <a:p>
-            <a:pPr algn="ctr"/>
-            <a:r>
-              <a:rPr lang="en-US" altLang="zh-CN" dirty="0" smtClean="0"/>
-              <a:t>ProxyGenerator</a:t>
-            </a:r>
-          </a:p>
-          <a:p>
-            <a:pPr algn="ctr"/>
-            <a:r>
-              <a:rPr lang="en-US" altLang="zh-CN" dirty="0" smtClean="0"/>
-              <a:t>.generateProxyClass()</a:t>
-            </a:r>
-            <a:endParaRPr lang="zh-CN" altLang="en-US" dirty="0"/>
-          </a:p>
-        </p:txBody>
-      </p:sp>
-      <p:sp>
-        <p:nvSpPr>
-          <p:cNvPr id="9" name="圆角矩形 8"/>
-          <p:cNvSpPr/>
-          <p:nvPr/>
-        </p:nvSpPr>
-        <p:spPr>
-          <a:xfrm>
-            <a:off x="2590801" y="1509965"/>
-            <a:ext cx="2053388" cy="794084"/>
-          </a:xfrm>
-          <a:prstGeom prst="roundRect">
-            <a:avLst/>
-          </a:prstGeom>
-        </p:spPr>
-        <p:style>
-          <a:lnRef idx="2">
-            <a:schemeClr val="accent2">
-              <a:shade val="50000"/>
-            </a:schemeClr>
-          </a:lnRef>
-          <a:fillRef idx="1">
-            <a:schemeClr val="accent2"/>
-          </a:fillRef>
-          <a:effectRef idx="0">
-            <a:schemeClr val="accent2"/>
-          </a:effectRef>
-          <a:fontRef idx="minor">
-            <a:schemeClr val="lt1"/>
-          </a:fontRef>
-        </p:style>
-        <p:txBody>
-          <a:bodyPr rtlCol="0" anchor="ctr"/>
-          <a:lstStyle/>
-          <a:p>
-            <a:pPr algn="ctr"/>
-            <a:r>
-              <a:rPr lang="en-US" altLang="zh-CN" dirty="0" smtClean="0"/>
-              <a:t>Class&lt;?&gt; = getProxyClass0()</a:t>
-            </a:r>
-            <a:endParaRPr lang="zh-CN" altLang="en-US" dirty="0"/>
-          </a:p>
-        </p:txBody>
-      </p:sp>
-      <p:sp>
-        <p:nvSpPr>
-          <p:cNvPr id="11" name="圆角矩形 10"/>
-          <p:cNvSpPr/>
-          <p:nvPr/>
-        </p:nvSpPr>
-        <p:spPr>
-          <a:xfrm>
-            <a:off x="433139" y="4660232"/>
-            <a:ext cx="2053389" cy="794084"/>
-          </a:xfrm>
-          <a:prstGeom prst="roundRect">
-            <a:avLst/>
-          </a:prstGeom>
-        </p:spPr>
-        <p:style>
-          <a:lnRef idx="2">
-            <a:schemeClr val="accent1">
-              <a:shade val="50000"/>
-            </a:schemeClr>
-          </a:lnRef>
-          <a:fillRef idx="1">
-            <a:schemeClr val="accent1"/>
-          </a:fillRef>
-          <a:effectRef idx="0">
-            <a:schemeClr val="accent1"/>
-          </a:effectRef>
-          <a:fontRef idx="minor">
-            <a:schemeClr val="lt1"/>
-          </a:fontRef>
-        </p:style>
-        <p:txBody>
-          <a:bodyPr rtlCol="0" anchor="ctr"/>
-          <a:lstStyle/>
-          <a:p>
-            <a:pPr algn="ctr"/>
-            <a:r>
-              <a:rPr lang="en-US" altLang="zh-CN" dirty="0" smtClean="0"/>
-              <a:t>byte[] </a:t>
-            </a:r>
-            <a:r>
-              <a:rPr lang="en-US" altLang="zh-CN" dirty="0" err="1" smtClean="0"/>
-              <a:t>proxyClassFile</a:t>
-            </a:r>
-            <a:endParaRPr lang="zh-CN" altLang="en-US" dirty="0"/>
-          </a:p>
-        </p:txBody>
-      </p:sp>
-      <p:sp>
-        <p:nvSpPr>
-          <p:cNvPr id="18" name="圆角矩形 17"/>
-          <p:cNvSpPr/>
-          <p:nvPr/>
-        </p:nvSpPr>
-        <p:spPr>
-          <a:xfrm>
-            <a:off x="2590801" y="4098760"/>
-            <a:ext cx="2053388" cy="794084"/>
-          </a:xfrm>
-          <a:prstGeom prst="roundRect">
-            <a:avLst/>
-          </a:prstGeom>
-        </p:spPr>
-        <p:style>
-          <a:lnRef idx="2">
-            <a:schemeClr val="accent2">
-              <a:shade val="50000"/>
-            </a:schemeClr>
-          </a:lnRef>
-          <a:fillRef idx="1">
-            <a:schemeClr val="accent2"/>
-          </a:fillRef>
-          <a:effectRef idx="0">
-            <a:schemeClr val="accent2"/>
-          </a:effectRef>
-          <a:fontRef idx="minor">
-            <a:schemeClr val="lt1"/>
-          </a:fontRef>
-        </p:style>
-        <p:txBody>
-          <a:bodyPr rtlCol="0" anchor="ctr"/>
-          <a:lstStyle/>
-          <a:p>
-            <a:pPr algn="ctr"/>
-            <a:r>
-              <a:rPr lang="en-US" altLang="zh-CN" dirty="0" smtClean="0"/>
-              <a:t>defineClass0()</a:t>
-            </a:r>
-            <a:endParaRPr lang="zh-CN" altLang="en-US" dirty="0"/>
-          </a:p>
-        </p:txBody>
-      </p:sp>
-      <p:sp>
-        <p:nvSpPr>
-          <p:cNvPr id="22" name="圆角矩形 21"/>
-          <p:cNvSpPr/>
-          <p:nvPr/>
-        </p:nvSpPr>
-        <p:spPr>
-          <a:xfrm>
-            <a:off x="2566739" y="2827422"/>
-            <a:ext cx="2053388" cy="794084"/>
-          </a:xfrm>
-          <a:prstGeom prst="roundRect">
-            <a:avLst/>
-          </a:prstGeom>
-        </p:spPr>
-        <p:style>
-          <a:lnRef idx="2">
-            <a:schemeClr val="accent2">
-              <a:shade val="50000"/>
-            </a:schemeClr>
-          </a:lnRef>
-          <a:fillRef idx="1">
-            <a:schemeClr val="accent2"/>
-          </a:fillRef>
-          <a:effectRef idx="0">
-            <a:schemeClr val="accent2"/>
-          </a:effectRef>
-          <a:fontRef idx="minor">
-            <a:schemeClr val="lt1"/>
-          </a:fontRef>
-        </p:style>
-        <p:txBody>
-          <a:bodyPr rtlCol="0" anchor="ctr"/>
-          <a:lstStyle/>
-          <a:p>
-            <a:pPr algn="ctr"/>
-            <a:r>
-              <a:rPr lang="en-US" altLang="zh-CN" dirty="0" smtClean="0"/>
-              <a:t>ProxyClassFactory</a:t>
-            </a:r>
-            <a:endParaRPr lang="en-US" altLang="zh-CN" dirty="0"/>
-          </a:p>
-          <a:p>
-            <a:pPr algn="ctr"/>
-            <a:r>
-              <a:rPr lang="en-US" altLang="zh-CN" dirty="0" smtClean="0"/>
-              <a:t>.apply()</a:t>
-            </a:r>
-            <a:endParaRPr lang="zh-CN" altLang="en-US" dirty="0"/>
+            <a:endParaRPr lang="en-US" altLang="zh-CN" dirty="0" smtClean="0">
+              <a:solidFill>
+                <a:schemeClr val="tx1">
+                  <a:lumMod val="95000"/>
+                  <a:lumOff val="5000"/>
+                </a:schemeClr>
+              </a:solidFill>
+            </a:endParaRPr>
+          </a:p>
+          <a:p>
+            <a:pPr algn="ctr"/>
+            <a:r>
+              <a:rPr lang="en-US" altLang="zh-CN" sz="1600" b="1" dirty="0" smtClean="0">
+                <a:solidFill>
+                  <a:schemeClr val="tx1">
+                    <a:lumMod val="95000"/>
+                    <a:lumOff val="5000"/>
+                  </a:schemeClr>
+                </a:solidFill>
+              </a:rPr>
+              <a:t>WeChatPay</a:t>
+            </a:r>
+            <a:endParaRPr lang="en-US" altLang="zh-CN" sz="1600" b="1" dirty="0">
+              <a:solidFill>
+                <a:schemeClr val="tx1">
+                  <a:lumMod val="95000"/>
+                  <a:lumOff val="5000"/>
+                </a:schemeClr>
+              </a:solidFill>
+            </a:endParaRPr>
+          </a:p>
+          <a:p>
+            <a:pPr algn="ctr"/>
+            <a:r>
+              <a:rPr lang="en-US" altLang="zh-CN" sz="1600" b="1" dirty="0">
+                <a:solidFill>
+                  <a:schemeClr val="tx1">
+                    <a:lumMod val="95000"/>
+                    <a:lumOff val="5000"/>
+                  </a:schemeClr>
+                </a:solidFill>
+              </a:rPr>
+              <a:t>pay()</a:t>
+            </a:r>
+          </a:p>
+          <a:p>
+            <a:pPr algn="ctr"/>
+            <a:r>
+              <a:rPr lang="en-US" altLang="zh-CN" sz="1600" b="1" dirty="0">
+                <a:solidFill>
+                  <a:schemeClr val="tx1">
+                    <a:lumMod val="95000"/>
+                    <a:lumOff val="5000"/>
+                  </a:schemeClr>
+                </a:solidFill>
+              </a:rPr>
+              <a:t>gathering()</a:t>
+            </a:r>
+            <a:endParaRPr lang="zh-CN" altLang="en-US" sz="1600" b="1" dirty="0">
+              <a:solidFill>
+                <a:schemeClr val="tx1">
+                  <a:lumMod val="95000"/>
+                  <a:lumOff val="5000"/>
+                </a:schemeClr>
+              </a:solidFill>
+            </a:endParaRPr>
+          </a:p>
+          <a:p>
+            <a:pPr algn="ctr"/>
+            <a:endParaRPr lang="zh-CN" altLang="en-US" sz="1600" b="1" dirty="0">
+              <a:solidFill>
+                <a:schemeClr val="tx1">
+                  <a:lumMod val="95000"/>
+                  <a:lumOff val="5000"/>
+                </a:schemeClr>
+              </a:solidFill>
+            </a:endParaRPr>
           </a:p>
         </p:txBody>
       </p:sp>
       <p:cxnSp>
         <p:nvCxnSpPr>
-          <p:cNvPr id="24" name="直接箭头连接符 23"/>
+          <p:cNvPr id="8" name="直接箭头连接符 7"/>
           <p:cNvCxnSpPr>
-            <a:stCxn id="4" idx="3"/>
-            <a:endCxn id="6" idx="1"/>
+            <a:stCxn id="5" idx="0"/>
+            <a:endCxn id="4" idx="2"/>
           </p:cNvCxnSpPr>
           <p:nvPr/>
         </p:nvCxnSpPr>
         <p:spPr>
-          <a:xfrm>
-            <a:off x="8029072" y="813134"/>
-            <a:ext cx="1620254" cy="0"/>
+          <a:xfrm flipV="1">
+            <a:off x="1235242" y="2092950"/>
+            <a:ext cx="1366586" cy="1446149"/>
           </a:xfrm>
           <a:prstGeom prst="straightConnector1">
             <a:avLst/>
           </a:prstGeom>
-          <a:ln>
+          <a:ln w="12700">
+            <a:prstDash val="dash"/>
             <a:tailEnd type="triangle"/>
           </a:ln>
         </p:spPr>
@@ -6242,22 +6180,23 @@
       </p:cxnSp>
       <p:cxnSp>
         <p:nvCxnSpPr>
-          <p:cNvPr id="29" name="直接箭头连接符 28"/>
+          <p:cNvPr id="10" name="直接箭头连接符 9"/>
           <p:cNvCxnSpPr>
-            <a:stCxn id="5" idx="3"/>
-            <a:endCxn id="4" idx="1"/>
+            <a:stCxn id="6" idx="0"/>
+            <a:endCxn id="4" idx="2"/>
           </p:cNvCxnSpPr>
           <p:nvPr/>
         </p:nvCxnSpPr>
         <p:spPr>
-          <a:xfrm>
-            <a:off x="4652210" y="794083"/>
-            <a:ext cx="1323473" cy="19051"/>
+          <a:xfrm flipH="1" flipV="1">
+            <a:off x="2601828" y="2092950"/>
+            <a:ext cx="1366587" cy="1418438"/>
           </a:xfrm>
           <a:prstGeom prst="straightConnector1">
             <a:avLst/>
           </a:prstGeom>
-          <a:ln>
+          <a:ln w="19050">
+            <a:prstDash val="dash"/>
             <a:tailEnd type="triangle"/>
           </a:ln>
         </p:spPr>
@@ -6278,22 +6217,631 @@
       </p:cxnSp>
       <p:cxnSp>
         <p:nvCxnSpPr>
-          <p:cNvPr id="50" name="直接箭头连接符 49"/>
+          <p:cNvPr id="16" name="直接箭头连接符 15"/>
           <p:cNvCxnSpPr>
-            <a:stCxn id="22" idx="0"/>
-            <a:endCxn id="9" idx="2"/>
+            <a:stCxn id="6" idx="1"/>
+            <a:endCxn id="5" idx="3"/>
           </p:cNvCxnSpPr>
           <p:nvPr/>
         </p:nvCxnSpPr>
         <p:spPr>
+          <a:xfrm flipH="1">
+            <a:off x="2133600" y="3922286"/>
+            <a:ext cx="936457" cy="13856"/>
+          </a:xfrm>
+          <a:prstGeom prst="straightConnector1">
+            <a:avLst/>
+          </a:prstGeom>
+          <a:ln>
+            <a:tailEnd type="triangle"/>
+          </a:ln>
+        </p:spPr>
+        <p:style>
+          <a:lnRef idx="1">
+            <a:schemeClr val="accent1"/>
+          </a:lnRef>
+          <a:fillRef idx="0">
+            <a:schemeClr val="accent1"/>
+          </a:fillRef>
+          <a:effectRef idx="0">
+            <a:schemeClr val="accent1"/>
+          </a:effectRef>
+          <a:fontRef idx="minor">
+            <a:schemeClr val="tx1"/>
+          </a:fontRef>
+        </p:style>
+      </p:cxnSp>
+      <p:sp>
+        <p:nvSpPr>
+          <p:cNvPr id="17" name="文本框 16"/>
+          <p:cNvSpPr txBox="1"/>
+          <p:nvPr/>
+        </p:nvSpPr>
+        <p:spPr>
+          <a:xfrm>
+            <a:off x="2273971" y="3539099"/>
+            <a:ext cx="685798" cy="369332"/>
+          </a:xfrm>
+          <a:prstGeom prst="rect">
+            <a:avLst/>
+          </a:prstGeom>
+          <a:noFill/>
+        </p:spPr>
+        <p:txBody>
+          <a:bodyPr wrap="square" rtlCol="0">
+            <a:spAutoFit/>
+          </a:bodyPr>
+          <a:lstStyle/>
+          <a:p>
+            <a:r>
+              <a:rPr lang="zh-CN" altLang="en-US" dirty="0">
+                <a:solidFill>
+                  <a:schemeClr val="tx1">
+                    <a:lumMod val="95000"/>
+                    <a:lumOff val="5000"/>
+                  </a:schemeClr>
+                </a:solidFill>
+              </a:rPr>
+              <a:t>代理</a:t>
+            </a:r>
+          </a:p>
+        </p:txBody>
+      </p:sp>
+      <p:sp>
+        <p:nvSpPr>
+          <p:cNvPr id="9" name="文本框 8"/>
+          <p:cNvSpPr txBox="1"/>
+          <p:nvPr/>
+        </p:nvSpPr>
+        <p:spPr>
+          <a:xfrm>
+            <a:off x="1134982" y="2454080"/>
+            <a:ext cx="1138989" cy="369332"/>
+          </a:xfrm>
+          <a:prstGeom prst="rect">
+            <a:avLst/>
+          </a:prstGeom>
+          <a:noFill/>
+        </p:spPr>
+        <p:txBody>
+          <a:bodyPr wrap="square" rtlCol="0">
+            <a:spAutoFit/>
+          </a:bodyPr>
+          <a:lstStyle/>
+          <a:p>
+            <a:r>
+              <a:rPr lang="zh-CN" altLang="en-US" dirty="0" smtClean="0"/>
+              <a:t>实现</a:t>
+            </a:r>
+            <a:endParaRPr lang="zh-CN" altLang="en-US" dirty="0"/>
+          </a:p>
+        </p:txBody>
+      </p:sp>
+      <p:sp>
+        <p:nvSpPr>
+          <p:cNvPr id="11" name="文本框 10"/>
+          <p:cNvSpPr txBox="1"/>
+          <p:nvPr/>
+        </p:nvSpPr>
+        <p:spPr>
+          <a:xfrm>
+            <a:off x="3398919" y="2462282"/>
+            <a:ext cx="1138989" cy="369332"/>
+          </a:xfrm>
+          <a:prstGeom prst="rect">
+            <a:avLst/>
+          </a:prstGeom>
+          <a:noFill/>
+        </p:spPr>
+        <p:txBody>
+          <a:bodyPr wrap="square" rtlCol="0">
+            <a:spAutoFit/>
+          </a:bodyPr>
+          <a:lstStyle/>
+          <a:p>
+            <a:r>
+              <a:rPr lang="zh-CN" altLang="en-US" dirty="0" smtClean="0"/>
+              <a:t>实现</a:t>
+            </a:r>
+            <a:endParaRPr lang="zh-CN" altLang="en-US" dirty="0"/>
+          </a:p>
+        </p:txBody>
+      </p:sp>
+      <p:sp>
+        <p:nvSpPr>
+          <p:cNvPr id="23" name="圆角矩形 22"/>
+          <p:cNvSpPr/>
+          <p:nvPr/>
+        </p:nvSpPr>
+        <p:spPr>
+          <a:xfrm>
+            <a:off x="7409947" y="744467"/>
+            <a:ext cx="2206794" cy="1348483"/>
+          </a:xfrm>
+          <a:prstGeom prst="roundRect">
+            <a:avLst/>
+          </a:prstGeom>
+        </p:spPr>
+        <p:style>
+          <a:lnRef idx="0">
+            <a:schemeClr val="accent1"/>
+          </a:lnRef>
+          <a:fillRef idx="3">
+            <a:schemeClr val="accent1"/>
+          </a:fillRef>
+          <a:effectRef idx="3">
+            <a:schemeClr val="accent1"/>
+          </a:effectRef>
+          <a:fontRef idx="minor">
+            <a:schemeClr val="lt1"/>
+          </a:fontRef>
+        </p:style>
+        <p:txBody>
+          <a:bodyPr rtlCol="0" anchor="ctr"/>
+          <a:lstStyle/>
+          <a:p>
+            <a:pPr algn="ctr"/>
+            <a:endParaRPr lang="en-US" altLang="zh-CN" sz="1400" dirty="0" smtClean="0">
+              <a:solidFill>
+                <a:schemeClr val="tx1">
+                  <a:lumMod val="95000"/>
+                  <a:lumOff val="5000"/>
+                </a:schemeClr>
+              </a:solidFill>
+            </a:endParaRPr>
+          </a:p>
+          <a:p>
+            <a:pPr algn="ctr"/>
+            <a:r>
+              <a:rPr lang="en-US" altLang="zh-CN" sz="1400" dirty="0" smtClean="0">
+                <a:solidFill>
+                  <a:schemeClr val="tx1">
+                    <a:lumMod val="95000"/>
+                    <a:lumOff val="5000"/>
+                  </a:schemeClr>
+                </a:solidFill>
+              </a:rPr>
+              <a:t>&lt;&lt;</a:t>
+            </a:r>
+            <a:r>
+              <a:rPr lang="en-US" altLang="zh-CN" sz="1400" dirty="0" smtClean="0">
+                <a:solidFill>
+                  <a:schemeClr val="tx1">
+                    <a:lumMod val="95000"/>
+                    <a:lumOff val="5000"/>
+                  </a:schemeClr>
+                </a:solidFill>
+              </a:rPr>
+              <a:t>interface&gt;&gt;</a:t>
+            </a:r>
+          </a:p>
+          <a:p>
+            <a:pPr algn="ctr"/>
+            <a:r>
+              <a:rPr lang="en-US" altLang="zh-CN" sz="1400" dirty="0" smtClean="0">
+                <a:solidFill>
+                  <a:schemeClr val="tx1">
+                    <a:lumMod val="95000"/>
+                    <a:lumOff val="5000"/>
+                  </a:schemeClr>
+                </a:solidFill>
+              </a:rPr>
+              <a:t>WealthManagement</a:t>
+            </a:r>
+            <a:endParaRPr lang="en-US" altLang="zh-CN" sz="1400" dirty="0">
+              <a:solidFill>
+                <a:schemeClr val="tx1">
+                  <a:lumMod val="95000"/>
+                  <a:lumOff val="5000"/>
+                </a:schemeClr>
+              </a:solidFill>
+            </a:endParaRPr>
+          </a:p>
+          <a:p>
+            <a:pPr algn="ctr"/>
+            <a:r>
+              <a:rPr lang="en-US" altLang="zh-CN" sz="1400" dirty="0" smtClean="0">
+                <a:solidFill>
+                  <a:schemeClr val="tx1">
+                    <a:lumMod val="95000"/>
+                    <a:lumOff val="5000"/>
+                  </a:schemeClr>
+                </a:solidFill>
+              </a:rPr>
+              <a:t>pay()</a:t>
+            </a:r>
+          </a:p>
+          <a:p>
+            <a:pPr algn="ctr"/>
+            <a:r>
+              <a:rPr lang="en-US" altLang="zh-CN" sz="1400" dirty="0">
+                <a:solidFill>
+                  <a:schemeClr val="tx1">
+                    <a:lumMod val="95000"/>
+                    <a:lumOff val="5000"/>
+                  </a:schemeClr>
+                </a:solidFill>
+              </a:rPr>
+              <a:t>g</a:t>
+            </a:r>
+            <a:r>
+              <a:rPr lang="en-US" altLang="zh-CN" sz="1400" dirty="0" smtClean="0">
+                <a:solidFill>
+                  <a:schemeClr val="tx1">
+                    <a:lumMod val="95000"/>
+                    <a:lumOff val="5000"/>
+                  </a:schemeClr>
+                </a:solidFill>
+              </a:rPr>
+              <a:t>athering</a:t>
+            </a:r>
+            <a:r>
+              <a:rPr lang="en-US" altLang="zh-CN" sz="1400" dirty="0" smtClean="0">
+                <a:solidFill>
+                  <a:schemeClr val="tx1">
+                    <a:lumMod val="95000"/>
+                    <a:lumOff val="5000"/>
+                  </a:schemeClr>
+                </a:solidFill>
+              </a:rPr>
+              <a:t>()</a:t>
+            </a:r>
+          </a:p>
+          <a:p>
+            <a:pPr algn="ctr"/>
+            <a:r>
+              <a:rPr lang="en-US" altLang="zh-CN" sz="1400" dirty="0">
+                <a:solidFill>
+                  <a:srgbClr val="FF0000"/>
+                </a:solidFill>
+              </a:rPr>
+              <a:t>refund()</a:t>
+            </a:r>
+          </a:p>
+          <a:p>
+            <a:pPr algn="ctr"/>
+            <a:r>
+              <a:rPr lang="en-US" altLang="zh-CN" sz="1400" dirty="0">
+                <a:solidFill>
+                  <a:srgbClr val="FF0000"/>
+                </a:solidFill>
+              </a:rPr>
+              <a:t>…</a:t>
+            </a:r>
+            <a:endParaRPr lang="zh-CN" altLang="en-US" sz="1400" dirty="0">
+              <a:solidFill>
+                <a:srgbClr val="FF0000"/>
+              </a:solidFill>
+            </a:endParaRPr>
+          </a:p>
+          <a:p>
+            <a:pPr algn="ctr"/>
+            <a:endParaRPr lang="zh-CN" altLang="en-US" sz="1400" dirty="0">
+              <a:solidFill>
+                <a:schemeClr val="tx1">
+                  <a:lumMod val="95000"/>
+                  <a:lumOff val="5000"/>
+                </a:schemeClr>
+              </a:solidFill>
+            </a:endParaRPr>
+          </a:p>
+        </p:txBody>
+      </p:sp>
+      <p:sp>
+        <p:nvSpPr>
+          <p:cNvPr id="24" name="矩形 23"/>
+          <p:cNvSpPr/>
+          <p:nvPr/>
+        </p:nvSpPr>
+        <p:spPr>
+          <a:xfrm>
+            <a:off x="6000654" y="3511387"/>
+            <a:ext cx="1796716" cy="1261139"/>
+          </a:xfrm>
+          <a:prstGeom prst="rect">
+            <a:avLst/>
+          </a:prstGeom>
+        </p:spPr>
+        <p:style>
+          <a:lnRef idx="0">
+            <a:schemeClr val="accent6"/>
+          </a:lnRef>
+          <a:fillRef idx="3">
+            <a:schemeClr val="accent6"/>
+          </a:fillRef>
+          <a:effectRef idx="3">
+            <a:schemeClr val="accent6"/>
+          </a:effectRef>
+          <a:fontRef idx="minor">
+            <a:schemeClr val="lt1"/>
+          </a:fontRef>
+        </p:style>
+        <p:txBody>
+          <a:bodyPr rtlCol="0" anchor="ctr"/>
+          <a:lstStyle/>
+          <a:p>
+            <a:pPr algn="ctr"/>
+            <a:r>
+              <a:rPr lang="en-US" altLang="zh-CN" sz="1600" b="1" dirty="0" smtClean="0">
+                <a:solidFill>
+                  <a:schemeClr val="tx1">
+                    <a:lumMod val="95000"/>
+                    <a:lumOff val="5000"/>
+                  </a:schemeClr>
+                </a:solidFill>
+              </a:rPr>
+              <a:t>Bank</a:t>
+            </a:r>
+            <a:endParaRPr lang="en-US" altLang="zh-CN" sz="1600" b="1" dirty="0">
+              <a:solidFill>
+                <a:schemeClr val="tx1">
+                  <a:lumMod val="95000"/>
+                  <a:lumOff val="5000"/>
+                </a:schemeClr>
+              </a:solidFill>
+            </a:endParaRPr>
+          </a:p>
+          <a:p>
+            <a:pPr algn="ctr"/>
+            <a:r>
+              <a:rPr lang="en-US" altLang="zh-CN" sz="1600" b="1" dirty="0">
+                <a:solidFill>
+                  <a:schemeClr val="tx1">
+                    <a:lumMod val="95000"/>
+                    <a:lumOff val="5000"/>
+                  </a:schemeClr>
+                </a:solidFill>
+              </a:rPr>
+              <a:t>pay()</a:t>
+            </a:r>
+          </a:p>
+          <a:p>
+            <a:pPr algn="ctr"/>
+            <a:r>
+              <a:rPr lang="en-US" altLang="zh-CN" sz="1600" b="1" dirty="0">
+                <a:solidFill>
+                  <a:schemeClr val="tx1">
+                    <a:lumMod val="95000"/>
+                    <a:lumOff val="5000"/>
+                  </a:schemeClr>
+                </a:solidFill>
+              </a:rPr>
+              <a:t>gathering</a:t>
+            </a:r>
+            <a:r>
+              <a:rPr lang="en-US" altLang="zh-CN" sz="1600" b="1" dirty="0" smtClean="0">
+                <a:solidFill>
+                  <a:schemeClr val="tx1">
+                    <a:lumMod val="95000"/>
+                    <a:lumOff val="5000"/>
+                  </a:schemeClr>
+                </a:solidFill>
+              </a:rPr>
+              <a:t>()</a:t>
+            </a:r>
+          </a:p>
+          <a:p>
+            <a:pPr algn="ctr"/>
+            <a:r>
+              <a:rPr lang="en-US" altLang="zh-CN" sz="1600" b="1" dirty="0">
+                <a:solidFill>
+                  <a:srgbClr val="FF0000"/>
+                </a:solidFill>
+              </a:rPr>
+              <a:t>refund</a:t>
+            </a:r>
+            <a:r>
+              <a:rPr lang="en-US" altLang="zh-CN" sz="1600" b="1" dirty="0" smtClean="0">
+                <a:solidFill>
+                  <a:srgbClr val="FF0000"/>
+                </a:solidFill>
+              </a:rPr>
+              <a:t>()</a:t>
+            </a:r>
+          </a:p>
+          <a:p>
+            <a:pPr algn="ctr"/>
+            <a:r>
+              <a:rPr lang="en-US" altLang="zh-CN" sz="1600" b="1" dirty="0" smtClean="0">
+                <a:solidFill>
+                  <a:srgbClr val="FF0000"/>
+                </a:solidFill>
+              </a:rPr>
+              <a:t>…</a:t>
+            </a:r>
+            <a:endParaRPr lang="zh-CN" altLang="en-US" sz="1600" b="1" dirty="0">
+              <a:solidFill>
+                <a:srgbClr val="FF0000"/>
+              </a:solidFill>
+            </a:endParaRPr>
+          </a:p>
+        </p:txBody>
+      </p:sp>
+      <p:sp>
+        <p:nvSpPr>
+          <p:cNvPr id="25" name="矩形 24"/>
+          <p:cNvSpPr/>
+          <p:nvPr/>
+        </p:nvSpPr>
+        <p:spPr>
+          <a:xfrm>
+            <a:off x="9259402" y="3505570"/>
+            <a:ext cx="1796716" cy="1266956"/>
+          </a:xfrm>
+          <a:prstGeom prst="rect">
+            <a:avLst/>
+          </a:prstGeom>
+        </p:spPr>
+        <p:style>
+          <a:lnRef idx="0">
+            <a:schemeClr val="accent4"/>
+          </a:lnRef>
+          <a:fillRef idx="3">
+            <a:schemeClr val="accent4"/>
+          </a:fillRef>
+          <a:effectRef idx="3">
+            <a:schemeClr val="accent4"/>
+          </a:effectRef>
+          <a:fontRef idx="minor">
+            <a:schemeClr val="lt1"/>
+          </a:fontRef>
+        </p:style>
+        <p:txBody>
+          <a:bodyPr rtlCol="0" anchor="ctr"/>
+          <a:lstStyle/>
+          <a:p>
+            <a:pPr algn="ctr"/>
+            <a:endParaRPr lang="en-US" altLang="zh-CN" dirty="0" smtClean="0">
+              <a:solidFill>
+                <a:schemeClr val="tx1">
+                  <a:lumMod val="95000"/>
+                  <a:lumOff val="5000"/>
+                </a:schemeClr>
+              </a:solidFill>
+            </a:endParaRPr>
+          </a:p>
+          <a:p>
+            <a:pPr algn="ctr"/>
+            <a:endParaRPr lang="en-US" altLang="zh-CN" sz="1600" b="1" dirty="0" smtClean="0">
+              <a:solidFill>
+                <a:schemeClr val="tx1">
+                  <a:lumMod val="95000"/>
+                  <a:lumOff val="5000"/>
+                </a:schemeClr>
+              </a:solidFill>
+            </a:endParaRPr>
+          </a:p>
+          <a:p>
+            <a:pPr algn="ctr"/>
+            <a:r>
+              <a:rPr lang="en-US" altLang="zh-CN" sz="1600" b="1" dirty="0" smtClean="0">
+                <a:solidFill>
+                  <a:schemeClr val="tx1">
+                    <a:lumMod val="95000"/>
+                    <a:lumOff val="5000"/>
+                  </a:schemeClr>
+                </a:solidFill>
+              </a:rPr>
+              <a:t>WeChatPay</a:t>
+            </a:r>
+            <a:endParaRPr lang="en-US" altLang="zh-CN" sz="1600" b="1" dirty="0">
+              <a:solidFill>
+                <a:schemeClr val="tx1">
+                  <a:lumMod val="95000"/>
+                  <a:lumOff val="5000"/>
+                </a:schemeClr>
+              </a:solidFill>
+            </a:endParaRPr>
+          </a:p>
+          <a:p>
+            <a:pPr algn="ctr"/>
+            <a:r>
+              <a:rPr lang="en-US" altLang="zh-CN" sz="1600" b="1" dirty="0">
+                <a:solidFill>
+                  <a:schemeClr val="tx1">
+                    <a:lumMod val="95000"/>
+                    <a:lumOff val="5000"/>
+                  </a:schemeClr>
+                </a:solidFill>
+              </a:rPr>
+              <a:t>pay()</a:t>
+            </a:r>
+          </a:p>
+          <a:p>
+            <a:pPr algn="ctr"/>
+            <a:r>
+              <a:rPr lang="en-US" altLang="zh-CN" sz="1600" b="1" dirty="0">
+                <a:solidFill>
+                  <a:schemeClr val="tx1">
+                    <a:lumMod val="95000"/>
+                    <a:lumOff val="5000"/>
+                  </a:schemeClr>
+                </a:solidFill>
+              </a:rPr>
+              <a:t>gathering</a:t>
+            </a:r>
+            <a:r>
+              <a:rPr lang="en-US" altLang="zh-CN" sz="1600" b="1" dirty="0" smtClean="0">
+                <a:solidFill>
+                  <a:schemeClr val="tx1">
+                    <a:lumMod val="95000"/>
+                    <a:lumOff val="5000"/>
+                  </a:schemeClr>
+                </a:solidFill>
+              </a:rPr>
+              <a:t>()</a:t>
+            </a:r>
+          </a:p>
+          <a:p>
+            <a:pPr algn="ctr"/>
+            <a:r>
+              <a:rPr lang="en-US" altLang="zh-CN" sz="1600" b="1" dirty="0" smtClean="0">
+                <a:solidFill>
+                  <a:srgbClr val="FF0000"/>
+                </a:solidFill>
+              </a:rPr>
+              <a:t>refund()</a:t>
+            </a:r>
+          </a:p>
+          <a:p>
+            <a:pPr algn="ctr"/>
+            <a:r>
+              <a:rPr lang="en-US" altLang="zh-CN" sz="1600" b="1" dirty="0">
+                <a:solidFill>
+                  <a:srgbClr val="FF0000"/>
+                </a:solidFill>
+              </a:rPr>
+              <a:t>…</a:t>
+            </a:r>
+            <a:endParaRPr lang="zh-CN" altLang="en-US" sz="1600" b="1" dirty="0">
+              <a:solidFill>
+                <a:srgbClr val="FF0000"/>
+              </a:solidFill>
+            </a:endParaRPr>
+          </a:p>
+          <a:p>
+            <a:pPr algn="ctr"/>
+            <a:endParaRPr lang="zh-CN" altLang="en-US" sz="1600" b="1" dirty="0">
+              <a:solidFill>
+                <a:schemeClr val="tx1">
+                  <a:lumMod val="95000"/>
+                  <a:lumOff val="5000"/>
+                </a:schemeClr>
+              </a:solidFill>
+            </a:endParaRPr>
+          </a:p>
+          <a:p>
+            <a:pPr algn="ctr"/>
+            <a:endParaRPr lang="zh-CN" altLang="en-US" sz="1600" b="1" dirty="0">
+              <a:solidFill>
+                <a:schemeClr val="tx1">
+                  <a:lumMod val="95000"/>
+                  <a:lumOff val="5000"/>
+                </a:schemeClr>
+              </a:solidFill>
+            </a:endParaRPr>
+          </a:p>
+        </p:txBody>
+      </p:sp>
+      <p:cxnSp>
+        <p:nvCxnSpPr>
+          <p:cNvPr id="26" name="直接箭头连接符 25"/>
+          <p:cNvCxnSpPr>
+            <a:stCxn id="24" idx="0"/>
+            <a:endCxn id="23" idx="2"/>
+          </p:cNvCxnSpPr>
+          <p:nvPr/>
+        </p:nvCxnSpPr>
+        <p:spPr>
           <a:xfrm flipV="1">
-            <a:off x="3593433" y="2304049"/>
-            <a:ext cx="24062" cy="523373"/>
+            <a:off x="6899012" y="2092950"/>
+            <a:ext cx="1614332" cy="1418437"/>
           </a:xfrm>
           <a:prstGeom prst="straightConnector1">
             <a:avLst/>
           </a:prstGeom>
-          <a:ln>
+          <a:ln w="12700">
+            <a:prstDash val="dash"/>
             <a:tailEnd type="triangle"/>
           </a:ln>
         </p:spPr>
@@ -6314,22 +6862,23 @@
       </p:cxnSp>
       <p:cxnSp>
         <p:nvCxnSpPr>
-          <p:cNvPr id="57" name="直接箭头连接符 56"/>
+          <p:cNvPr id="27" name="直接箭头连接符 26"/>
           <p:cNvCxnSpPr>
-            <a:stCxn id="7" idx="0"/>
-            <a:endCxn id="18" idx="2"/>
+            <a:stCxn id="25" idx="0"/>
+            <a:endCxn id="23" idx="2"/>
           </p:cNvCxnSpPr>
           <p:nvPr/>
         </p:nvCxnSpPr>
         <p:spPr>
-          <a:xfrm flipV="1">
-            <a:off x="3617495" y="4892844"/>
-            <a:ext cx="0" cy="762001"/>
+          <a:xfrm flipH="1" flipV="1">
+            <a:off x="8513344" y="2092950"/>
+            <a:ext cx="1644416" cy="1412620"/>
           </a:xfrm>
           <a:prstGeom prst="straightConnector1">
             <a:avLst/>
           </a:prstGeom>
-          <a:ln>
+          <a:ln w="19050">
+            <a:prstDash val="dash"/>
             <a:tailEnd type="triangle"/>
           </a:ln>
         </p:spPr>
@@ -6350,17 +6899,17 @@
       </p:cxnSp>
       <p:cxnSp>
         <p:nvCxnSpPr>
-          <p:cNvPr id="63" name="直接箭头连接符 62"/>
+          <p:cNvPr id="28" name="直接箭头连接符 27"/>
           <p:cNvCxnSpPr>
-            <a:stCxn id="18" idx="0"/>
-            <a:endCxn id="22" idx="2"/>
+            <a:stCxn id="25" idx="1"/>
+            <a:endCxn id="24" idx="3"/>
           </p:cNvCxnSpPr>
           <p:nvPr/>
         </p:nvCxnSpPr>
         <p:spPr>
-          <a:xfrm flipH="1" flipV="1">
-            <a:off x="3593433" y="3621506"/>
-            <a:ext cx="24062" cy="477254"/>
+          <a:xfrm flipH="1">
+            <a:off x="7797370" y="4139048"/>
+            <a:ext cx="1462032" cy="2909"/>
           </a:xfrm>
           <a:prstGeom prst="straightConnector1">
             <a:avLst/>
@@ -6386,43 +6935,65 @@
       </p:cxnSp>
       <p:sp>
         <p:nvSpPr>
-          <p:cNvPr id="72" name="圆角矩形 71"/>
-          <p:cNvSpPr/>
-          <p:nvPr/>
-        </p:nvSpPr>
-        <p:spPr>
-          <a:xfrm>
-            <a:off x="4948989" y="3366837"/>
-            <a:ext cx="2053389" cy="794084"/>
-          </a:xfrm>
-          <a:prstGeom prst="roundRect">
-            <a:avLst/>
-          </a:prstGeom>
-        </p:spPr>
-        <p:style>
-          <a:lnRef idx="2">
-            <a:schemeClr val="accent1">
-              <a:shade val="50000"/>
-            </a:schemeClr>
-          </a:lnRef>
-          <a:fillRef idx="1">
-            <a:schemeClr val="accent1"/>
-          </a:fillRef>
-          <a:effectRef idx="0">
-            <a:schemeClr val="accent1"/>
-          </a:effectRef>
-          <a:fontRef idx="minor">
-            <a:schemeClr val="lt1"/>
-          </a:fontRef>
-        </p:style>
-        <p:txBody>
-          <a:bodyPr rtlCol="0" anchor="ctr"/>
-          <a:lstStyle/>
-          <a:p>
-            <a:pPr algn="ctr"/>
-            <a:r>
-              <a:rPr lang="en-US" altLang="zh-CN" dirty="0" smtClean="0"/>
-              <a:t>Class&lt;?&gt; cl</a:t>
+          <p:cNvPr id="29" name="文本框 28"/>
+          <p:cNvSpPr txBox="1"/>
+          <p:nvPr/>
+        </p:nvSpPr>
+        <p:spPr>
+          <a:xfrm>
+            <a:off x="8185487" y="3539099"/>
+            <a:ext cx="685798" cy="369332"/>
+          </a:xfrm>
+          <a:prstGeom prst="rect">
+            <a:avLst/>
+          </a:prstGeom>
+          <a:noFill/>
+        </p:spPr>
+        <p:txBody>
+          <a:bodyPr wrap="square" rtlCol="0">
+            <a:spAutoFit/>
+          </a:bodyPr>
+          <a:lstStyle/>
+          <a:p>
+            <a:r>
+              <a:rPr lang="zh-CN" altLang="en-US" dirty="0">
+                <a:solidFill>
+                  <a:schemeClr val="tx1">
+                    <a:lumMod val="95000"/>
+                    <a:lumOff val="5000"/>
+                  </a:schemeClr>
+                </a:solidFill>
+              </a:rPr>
+              <a:t>代理</a:t>
+            </a:r>
+          </a:p>
+        </p:txBody>
+      </p:sp>
+      <p:sp>
+        <p:nvSpPr>
+          <p:cNvPr id="30" name="文本框 29"/>
+          <p:cNvSpPr txBox="1"/>
+          <p:nvPr/>
+        </p:nvSpPr>
+        <p:spPr>
+          <a:xfrm>
+            <a:off x="7046498" y="2454080"/>
+            <a:ext cx="1138989" cy="369332"/>
+          </a:xfrm>
+          <a:prstGeom prst="rect">
+            <a:avLst/>
+          </a:prstGeom>
+          <a:noFill/>
+        </p:spPr>
+        <p:txBody>
+          <a:bodyPr wrap="square" rtlCol="0">
+            <a:spAutoFit/>
+          </a:bodyPr>
+          <a:lstStyle/>
+          <a:p>
+            <a:r>
+              <a:rPr lang="zh-CN" altLang="en-US" dirty="0" smtClean="0"/>
+              <a:t>实现</a:t>
             </a:r>
             <a:endParaRPr lang="zh-CN" altLang="en-US" dirty="0"/>
           </a:p>
@@ -6430,180 +7001,229 @@
       </p:sp>
       <p:sp>
         <p:nvSpPr>
-          <p:cNvPr id="73" name="圆角矩形 72"/>
-          <p:cNvSpPr/>
-          <p:nvPr/>
-        </p:nvSpPr>
-        <p:spPr>
-          <a:xfrm>
-            <a:off x="4920917" y="2168693"/>
-            <a:ext cx="2053389" cy="794084"/>
-          </a:xfrm>
-          <a:prstGeom prst="roundRect">
-            <a:avLst/>
-          </a:prstGeom>
-        </p:spPr>
-        <p:style>
-          <a:lnRef idx="2">
-            <a:schemeClr val="accent1">
-              <a:shade val="50000"/>
-            </a:schemeClr>
-          </a:lnRef>
-          <a:fillRef idx="1">
-            <a:schemeClr val="accent1"/>
-          </a:fillRef>
-          <a:effectRef idx="0">
-            <a:schemeClr val="accent1"/>
-          </a:effectRef>
-          <a:fontRef idx="minor">
-            <a:schemeClr val="lt1"/>
-          </a:fontRef>
-        </p:style>
-        <p:txBody>
-          <a:bodyPr rtlCol="0" anchor="ctr"/>
-          <a:lstStyle/>
-          <a:p>
-            <a:pPr algn="ctr"/>
-            <a:r>
-              <a:rPr lang="en-US" altLang="zh-CN" dirty="0" smtClean="0"/>
-              <a:t>Class&lt;?&gt; cl</a:t>
+          <p:cNvPr id="31" name="文本框 30"/>
+          <p:cNvSpPr txBox="1"/>
+          <p:nvPr/>
+        </p:nvSpPr>
+        <p:spPr>
+          <a:xfrm>
+            <a:off x="9310435" y="2462282"/>
+            <a:ext cx="1138989" cy="369332"/>
+          </a:xfrm>
+          <a:prstGeom prst="rect">
+            <a:avLst/>
+          </a:prstGeom>
+          <a:noFill/>
+        </p:spPr>
+        <p:txBody>
+          <a:bodyPr wrap="square" rtlCol="0">
+            <a:spAutoFit/>
+          </a:bodyPr>
+          <a:lstStyle/>
+          <a:p>
+            <a:r>
+              <a:rPr lang="zh-CN" altLang="en-US" dirty="0" smtClean="0"/>
+              <a:t>实现</a:t>
             </a:r>
             <a:endParaRPr lang="zh-CN" altLang="en-US" dirty="0"/>
           </a:p>
         </p:txBody>
       </p:sp>
-      <p:cxnSp>
-        <p:nvCxnSpPr>
-          <p:cNvPr id="75" name="直接箭头连接符 74"/>
-          <p:cNvCxnSpPr>
-            <a:stCxn id="9" idx="0"/>
-            <a:endCxn id="5" idx="2"/>
-          </p:cNvCxnSpPr>
-          <p:nvPr/>
-        </p:nvCxnSpPr>
-        <p:spPr>
-          <a:xfrm flipV="1">
-            <a:off x="3617495" y="1191125"/>
-            <a:ext cx="8021" cy="318840"/>
-          </a:xfrm>
-          <a:prstGeom prst="straightConnector1">
-            <a:avLst/>
-          </a:prstGeom>
-          <a:ln>
-            <a:tailEnd type="triangle"/>
-          </a:ln>
-        </p:spPr>
-        <p:style>
-          <a:lnRef idx="1">
-            <a:schemeClr val="accent1"/>
-          </a:lnRef>
-          <a:fillRef idx="0">
-            <a:schemeClr val="accent1"/>
-          </a:fillRef>
-          <a:effectRef idx="0">
-            <a:schemeClr val="accent1"/>
-          </a:effectRef>
-          <a:fontRef idx="minor">
-            <a:schemeClr val="tx1"/>
-          </a:fontRef>
-        </p:style>
-      </p:cxnSp>
-      <p:sp>
-        <p:nvSpPr>
-          <p:cNvPr id="79" name="矩形 78"/>
-          <p:cNvSpPr/>
-          <p:nvPr/>
-        </p:nvSpPr>
-        <p:spPr>
-          <a:xfrm>
-            <a:off x="2494548" y="5454316"/>
-            <a:ext cx="2253915" cy="1402682"/>
+      <p:sp>
+        <p:nvSpPr>
+          <p:cNvPr id="61" name="文本框 60"/>
+          <p:cNvSpPr txBox="1"/>
+          <p:nvPr/>
+        </p:nvSpPr>
+        <p:spPr>
+          <a:xfrm>
+            <a:off x="6248400" y="5403096"/>
+            <a:ext cx="4529889" cy="646331"/>
           </a:xfrm>
           <a:prstGeom prst="rect">
             <a:avLst/>
           </a:prstGeom>
           <a:noFill/>
-          <a:ln w="57150">
-            <a:solidFill>
-              <a:srgbClr val="92D050"/>
-            </a:solidFill>
-          </a:ln>
-        </p:spPr>
-        <p:style>
-          <a:lnRef idx="2">
-            <a:schemeClr val="accent1">
-              <a:shade val="50000"/>
-            </a:schemeClr>
-          </a:lnRef>
-          <a:fillRef idx="1">
-            <a:schemeClr val="accent1"/>
-          </a:fillRef>
-          <a:effectRef idx="0">
-            <a:schemeClr val="accent1"/>
-          </a:effectRef>
-          <a:fontRef idx="minor">
-            <a:schemeClr val="lt1"/>
-          </a:fontRef>
-        </p:style>
-        <p:txBody>
-          <a:bodyPr rtlCol="0" anchor="ctr"/>
-          <a:lstStyle/>
-          <a:p>
-            <a:pPr algn="ctr"/>
-            <a:endParaRPr lang="zh-CN" altLang="en-US"/>
-          </a:p>
-        </p:txBody>
-      </p:sp>
-      <p:sp>
-        <p:nvSpPr>
-          <p:cNvPr id="80" name="矩形 79"/>
-          <p:cNvSpPr/>
-          <p:nvPr/>
-        </p:nvSpPr>
-        <p:spPr>
-          <a:xfrm>
-            <a:off x="2157662" y="2622889"/>
-            <a:ext cx="2662991" cy="1154526"/>
+        </p:spPr>
+        <p:txBody>
+          <a:bodyPr wrap="square" rtlCol="0">
+            <a:spAutoFit/>
+          </a:bodyPr>
+          <a:lstStyle/>
+          <a:p>
+            <a:pPr algn="ctr"/>
+            <a:r>
+              <a:rPr lang="zh-CN" altLang="en-US" dirty="0" smtClean="0"/>
+              <a:t>每个被代理</a:t>
+            </a:r>
+            <a:r>
+              <a:rPr lang="zh-CN" altLang="en-US" dirty="0" smtClean="0"/>
+              <a:t>类的</a:t>
+            </a:r>
+            <a:r>
+              <a:rPr lang="zh-CN" altLang="en-US" dirty="0" smtClean="0"/>
+              <a:t>方法</a:t>
+            </a:r>
+            <a:r>
+              <a:rPr lang="zh-CN" altLang="en-US" dirty="0" smtClean="0"/>
+              <a:t>都得被代理类重写，</a:t>
+            </a:r>
+            <a:endParaRPr lang="en-US" altLang="zh-CN" dirty="0" smtClean="0"/>
+          </a:p>
+          <a:p>
+            <a:pPr algn="ctr"/>
+            <a:r>
+              <a:rPr lang="zh-CN" altLang="en-US" dirty="0" smtClean="0"/>
+              <a:t>容易</a:t>
+            </a:r>
+            <a:r>
+              <a:rPr lang="zh-CN" altLang="en-US" dirty="0" smtClean="0"/>
+              <a:t>造成</a:t>
+            </a:r>
+            <a:r>
+              <a:rPr lang="zh-CN" altLang="en-US" dirty="0" smtClean="0"/>
+              <a:t>“代码爆炸”</a:t>
+            </a:r>
+            <a:endParaRPr lang="zh-CN" altLang="en-US" dirty="0"/>
+          </a:p>
+        </p:txBody>
+      </p:sp>
+      <p:sp>
+        <p:nvSpPr>
+          <p:cNvPr id="64" name="文本框 63"/>
+          <p:cNvSpPr txBox="1"/>
+          <p:nvPr/>
+        </p:nvSpPr>
+        <p:spPr>
+          <a:xfrm>
+            <a:off x="480165" y="4428891"/>
+            <a:ext cx="1510154" cy="369332"/>
           </a:xfrm>
           <a:prstGeom prst="rect">
             <a:avLst/>
           </a:prstGeom>
           <a:noFill/>
-          <a:ln w="57150">
-            <a:solidFill>
-              <a:srgbClr val="FF0000"/>
-            </a:solidFill>
-          </a:ln>
-        </p:spPr>
-        <p:style>
-          <a:lnRef idx="2">
-            <a:schemeClr val="accent1">
-              <a:shade val="50000"/>
-            </a:schemeClr>
-          </a:lnRef>
-          <a:fillRef idx="1">
-            <a:schemeClr val="accent1"/>
-          </a:fillRef>
-          <a:effectRef idx="0">
-            <a:schemeClr val="accent1"/>
-          </a:effectRef>
-          <a:fontRef idx="minor">
-            <a:schemeClr val="lt1"/>
-          </a:fontRef>
-        </p:style>
-        <p:txBody>
-          <a:bodyPr rtlCol="0" anchor="ctr"/>
-          <a:lstStyle/>
-          <a:p>
-            <a:pPr algn="ctr"/>
-            <a:endParaRPr lang="zh-CN" altLang="en-US"/>
+        </p:spPr>
+        <p:txBody>
+          <a:bodyPr wrap="square" rtlCol="0">
+            <a:spAutoFit/>
+          </a:bodyPr>
+          <a:lstStyle/>
+          <a:p>
+            <a:pPr algn="ctr"/>
+            <a:r>
+              <a:rPr lang="zh-CN" altLang="en-US" dirty="0" smtClean="0"/>
+              <a:t>被代理类</a:t>
+            </a:r>
+            <a:endParaRPr lang="zh-CN" altLang="en-US" dirty="0"/>
+          </a:p>
+        </p:txBody>
+      </p:sp>
+      <p:sp>
+        <p:nvSpPr>
+          <p:cNvPr id="65" name="文本框 64"/>
+          <p:cNvSpPr txBox="1"/>
+          <p:nvPr/>
+        </p:nvSpPr>
+        <p:spPr>
+          <a:xfrm>
+            <a:off x="3213336" y="4428891"/>
+            <a:ext cx="1510154" cy="369332"/>
+          </a:xfrm>
+          <a:prstGeom prst="rect">
+            <a:avLst/>
+          </a:prstGeom>
+          <a:noFill/>
+        </p:spPr>
+        <p:txBody>
+          <a:bodyPr wrap="square" rtlCol="0">
+            <a:spAutoFit/>
+          </a:bodyPr>
+          <a:lstStyle/>
+          <a:p>
+            <a:pPr algn="ctr"/>
+            <a:r>
+              <a:rPr lang="zh-CN" altLang="en-US" dirty="0" smtClean="0"/>
+              <a:t>代理</a:t>
+            </a:r>
+            <a:r>
+              <a:rPr lang="zh-CN" altLang="en-US" dirty="0" smtClean="0"/>
+              <a:t>类</a:t>
+            </a:r>
+            <a:endParaRPr lang="zh-CN" altLang="en-US" dirty="0"/>
+          </a:p>
+        </p:txBody>
+      </p:sp>
+      <p:sp>
+        <p:nvSpPr>
+          <p:cNvPr id="66" name="文本框 65"/>
+          <p:cNvSpPr txBox="1"/>
+          <p:nvPr/>
+        </p:nvSpPr>
+        <p:spPr>
+          <a:xfrm>
+            <a:off x="6391681" y="4908941"/>
+            <a:ext cx="1510154" cy="369332"/>
+          </a:xfrm>
+          <a:prstGeom prst="rect">
+            <a:avLst/>
+          </a:prstGeom>
+          <a:noFill/>
+        </p:spPr>
+        <p:txBody>
+          <a:bodyPr wrap="square" rtlCol="0">
+            <a:spAutoFit/>
+          </a:bodyPr>
+          <a:lstStyle/>
+          <a:p>
+            <a:pPr algn="ctr"/>
+            <a:r>
+              <a:rPr lang="zh-CN" altLang="en-US" dirty="0" smtClean="0"/>
+              <a:t>被代理类</a:t>
+            </a:r>
+            <a:endParaRPr lang="zh-CN" altLang="en-US" dirty="0"/>
+          </a:p>
+        </p:txBody>
+      </p:sp>
+      <p:sp>
+        <p:nvSpPr>
+          <p:cNvPr id="67" name="文本框 66"/>
+          <p:cNvSpPr txBox="1"/>
+          <p:nvPr/>
+        </p:nvSpPr>
+        <p:spPr>
+          <a:xfrm>
+            <a:off x="9402683" y="4910257"/>
+            <a:ext cx="1510154" cy="369332"/>
+          </a:xfrm>
+          <a:prstGeom prst="rect">
+            <a:avLst/>
+          </a:prstGeom>
+          <a:noFill/>
+        </p:spPr>
+        <p:txBody>
+          <a:bodyPr wrap="square" rtlCol="0">
+            <a:spAutoFit/>
+          </a:bodyPr>
+          <a:lstStyle/>
+          <a:p>
+            <a:pPr algn="ctr"/>
+            <a:r>
+              <a:rPr lang="zh-CN" altLang="en-US" dirty="0" smtClean="0"/>
+              <a:t>代理</a:t>
+            </a:r>
+            <a:r>
+              <a:rPr lang="zh-CN" altLang="en-US" dirty="0" smtClean="0"/>
+              <a:t>类</a:t>
+            </a:r>
+            <a:endParaRPr lang="zh-CN" altLang="en-US" dirty="0"/>
           </a:p>
         </p:txBody>
       </p:sp>
     </p:spTree>
     <p:extLst>
       <p:ext uri="{BB962C8B-B14F-4D97-AF65-F5344CB8AC3E}">
-        <p14:creationId xmlns:p14="http://schemas.microsoft.com/office/powerpoint/2010/main" val="974033400"/>
+        <p14:creationId xmlns:p14="http://schemas.microsoft.com/office/powerpoint/2010/main" val="3426291045"/>
       </p:ext>
     </p:extLst>
   </p:cSld>
@@ -6639,6 +7259,2407 @@
       </p:grpSpPr>
       <p:sp>
         <p:nvSpPr>
+          <p:cNvPr id="2" name="文本框 1"/>
+          <p:cNvSpPr txBox="1"/>
+          <p:nvPr/>
+        </p:nvSpPr>
+        <p:spPr>
+          <a:xfrm>
+            <a:off x="1259359" y="435351"/>
+            <a:ext cx="4289957" cy="3785652"/>
+          </a:xfrm>
+          <a:prstGeom prst="rect">
+            <a:avLst/>
+          </a:prstGeom>
+          <a:noFill/>
+        </p:spPr>
+        <p:txBody>
+          <a:bodyPr wrap="none" rtlCol="0">
+            <a:spAutoFit/>
+          </a:bodyPr>
+          <a:lstStyle/>
+          <a:p>
+            <a:r>
+              <a:rPr lang="en-US" altLang="zh-CN" sz="1600" dirty="0"/>
+              <a:t>public void pay() { //</a:t>
+            </a:r>
+            <a:r>
+              <a:rPr lang="zh-CN" altLang="en-US" sz="1600" dirty="0"/>
+              <a:t>付款功能</a:t>
+            </a:r>
+            <a:r>
+              <a:rPr lang="zh-CN" altLang="en-US" sz="1600" dirty="0"/>
+              <a:t/>
+            </a:r>
+            <a:br>
+              <a:rPr lang="zh-CN" altLang="en-US" sz="1600" dirty="0"/>
+            </a:br>
+            <a:r>
+              <a:rPr lang="zh-CN" altLang="en-US" sz="1600" dirty="0" smtClean="0"/>
+              <a:t>    </a:t>
+            </a:r>
+            <a:r>
+              <a:rPr lang="en-US" altLang="zh-CN" sz="1600" dirty="0" smtClean="0"/>
+              <a:t>System.out.println(“</a:t>
+            </a:r>
+            <a:r>
+              <a:rPr lang="zh-CN" altLang="en-US" sz="1600" dirty="0" smtClean="0"/>
+              <a:t>您正在使用微信支付</a:t>
+            </a:r>
+            <a:r>
+              <a:rPr lang="en-US" altLang="zh-CN" sz="1600" dirty="0" smtClean="0"/>
+              <a:t>...”);</a:t>
+            </a:r>
+            <a:r>
+              <a:rPr lang="zh-CN" altLang="en-US" sz="1600" dirty="0" smtClean="0"/>
+              <a:t/>
+            </a:r>
+            <a:br>
+              <a:rPr lang="zh-CN" altLang="en-US" sz="1600" dirty="0" smtClean="0"/>
+            </a:br>
+            <a:r>
+              <a:rPr lang="en-US" altLang="zh-CN" sz="1600" dirty="0"/>
+              <a:t> </a:t>
+            </a:r>
+            <a:r>
+              <a:rPr lang="en-US" altLang="zh-CN" sz="1600" dirty="0" smtClean="0"/>
+              <a:t>   bank.pay();</a:t>
+            </a:r>
+            <a:br>
+              <a:rPr lang="en-US" altLang="zh-CN" sz="1600" dirty="0" smtClean="0"/>
+            </a:br>
+            <a:r>
+              <a:rPr lang="en-US" altLang="zh-CN" sz="1600" dirty="0" smtClean="0"/>
+              <a:t>    System.out.println("</a:t>
+            </a:r>
+            <a:r>
+              <a:rPr lang="zh-CN" altLang="en-US" sz="1600" dirty="0" smtClean="0"/>
+              <a:t>微信支付使用完毕</a:t>
+            </a:r>
+            <a:r>
+              <a:rPr lang="en-US" altLang="zh-CN" sz="1600" dirty="0" smtClean="0"/>
+              <a:t>...");</a:t>
+            </a:r>
+            <a:r>
+              <a:rPr lang="zh-CN" altLang="en-US" sz="1600" dirty="0" smtClean="0"/>
+              <a:t/>
+            </a:r>
+            <a:br>
+              <a:rPr lang="zh-CN" altLang="en-US" sz="1600" dirty="0" smtClean="0"/>
+            </a:br>
+            <a:r>
+              <a:rPr lang="en-US" altLang="zh-CN" sz="1600" dirty="0" smtClean="0"/>
+              <a:t>}</a:t>
+            </a:r>
+            <a:r>
+              <a:rPr lang="zh-CN" altLang="en-US" sz="1600" dirty="0" smtClean="0"/>
+              <a:t/>
+            </a:r>
+            <a:br>
+              <a:rPr lang="zh-CN" altLang="en-US" sz="1600" dirty="0" smtClean="0"/>
+            </a:br>
+            <a:r>
+              <a:rPr lang="en-US" altLang="zh-CN" sz="1600" dirty="0" smtClean="0"/>
+              <a:t>public void gathering() {   //</a:t>
+            </a:r>
+            <a:r>
+              <a:rPr lang="zh-CN" altLang="en-US" sz="1600" dirty="0" smtClean="0"/>
+              <a:t>收款功能</a:t>
+            </a:r>
+            <a:br>
+              <a:rPr lang="zh-CN" altLang="en-US" sz="1600" dirty="0" smtClean="0"/>
+            </a:br>
+            <a:r>
+              <a:rPr lang="zh-CN" altLang="en-US" sz="1600" dirty="0" smtClean="0"/>
+              <a:t>    </a:t>
+            </a:r>
+            <a:r>
+              <a:rPr lang="en-US" altLang="zh-CN" sz="1600" dirty="0" smtClean="0"/>
+              <a:t>System.out.println("</a:t>
+            </a:r>
+            <a:r>
+              <a:rPr lang="zh-CN" altLang="en-US" sz="1600" dirty="0" smtClean="0"/>
+              <a:t>您正在使用微信支付</a:t>
+            </a:r>
+            <a:r>
+              <a:rPr lang="en-US" altLang="zh-CN" sz="1600" dirty="0" smtClean="0"/>
+              <a:t>...");</a:t>
+            </a:r>
+            <a:r>
+              <a:rPr lang="zh-CN" altLang="en-US" sz="1600" dirty="0" smtClean="0"/>
+              <a:t/>
+            </a:r>
+            <a:br>
+              <a:rPr lang="zh-CN" altLang="en-US" sz="1600" dirty="0" smtClean="0"/>
+            </a:br>
+            <a:r>
+              <a:rPr lang="zh-CN" altLang="en-US" sz="1600" dirty="0" smtClean="0"/>
+              <a:t>    </a:t>
+            </a:r>
+            <a:r>
+              <a:rPr lang="en-US" altLang="zh-CN" sz="1600" dirty="0" smtClean="0"/>
+              <a:t>bank.gathering();</a:t>
+            </a:r>
+            <a:br>
+              <a:rPr lang="en-US" altLang="zh-CN" sz="1600" dirty="0" smtClean="0"/>
+            </a:br>
+            <a:r>
+              <a:rPr lang="en-US" altLang="zh-CN" sz="1600" dirty="0" smtClean="0"/>
+              <a:t>    System.out.println("</a:t>
+            </a:r>
+            <a:r>
+              <a:rPr lang="zh-CN" altLang="en-US" sz="1600" dirty="0" smtClean="0"/>
+              <a:t>微信支付使用完毕</a:t>
+            </a:r>
+            <a:r>
+              <a:rPr lang="en-US" altLang="zh-CN" sz="1600" dirty="0" smtClean="0"/>
+              <a:t>...");</a:t>
+            </a:r>
+            <a:r>
+              <a:rPr lang="zh-CN" altLang="en-US" sz="1600" dirty="0" smtClean="0"/>
+              <a:t/>
+            </a:r>
+            <a:br>
+              <a:rPr lang="zh-CN" altLang="en-US" sz="1600" dirty="0" smtClean="0"/>
+            </a:br>
+            <a:r>
+              <a:rPr lang="en-US" altLang="zh-CN" sz="1600" dirty="0" smtClean="0"/>
+              <a:t>}</a:t>
+            </a:r>
+          </a:p>
+          <a:p>
+            <a:r>
+              <a:rPr lang="en-US" altLang="zh-CN" sz="1600" dirty="0" smtClean="0"/>
+              <a:t>public void refund() {</a:t>
+            </a:r>
+          </a:p>
+          <a:p>
+            <a:r>
+              <a:rPr lang="en-US" altLang="zh-CN" sz="1600" dirty="0"/>
+              <a:t> </a:t>
+            </a:r>
+            <a:r>
+              <a:rPr lang="en-US" altLang="zh-CN" sz="1600" dirty="0" smtClean="0"/>
+              <a:t>  </a:t>
+            </a:r>
+            <a:r>
+              <a:rPr lang="zh-CN" altLang="en-US" sz="1600" dirty="0"/>
+              <a:t> </a:t>
+            </a:r>
+            <a:r>
+              <a:rPr lang="en-US" altLang="zh-CN" sz="1600" dirty="0"/>
+              <a:t>System.out.println("</a:t>
+            </a:r>
+            <a:r>
+              <a:rPr lang="zh-CN" altLang="en-US" sz="1600" dirty="0"/>
+              <a:t>您正在使用微信支付</a:t>
+            </a:r>
+            <a:r>
+              <a:rPr lang="en-US" altLang="zh-CN" sz="1600" dirty="0"/>
+              <a:t>...");</a:t>
+            </a:r>
+            <a:r>
+              <a:rPr lang="zh-CN" altLang="en-US" sz="1600" dirty="0"/>
+              <a:t/>
+            </a:r>
+            <a:br>
+              <a:rPr lang="zh-CN" altLang="en-US" sz="1600" dirty="0"/>
+            </a:br>
+            <a:r>
+              <a:rPr lang="zh-CN" altLang="en-US" sz="1600" dirty="0"/>
+              <a:t>    </a:t>
+            </a:r>
+            <a:r>
+              <a:rPr lang="en-US" altLang="zh-CN" sz="1600" dirty="0"/>
+              <a:t>bank</a:t>
+            </a:r>
+            <a:r>
+              <a:rPr lang="en-US" altLang="zh-CN" sz="1600" dirty="0" smtClean="0"/>
+              <a:t>.</a:t>
+            </a:r>
+            <a:r>
+              <a:rPr lang="en-US" altLang="zh-CN" sz="1600" dirty="0"/>
+              <a:t> refund</a:t>
+            </a:r>
+            <a:r>
+              <a:rPr lang="en-US" altLang="zh-CN" sz="1600" dirty="0" smtClean="0"/>
+              <a:t>();</a:t>
+            </a:r>
+            <a:r>
+              <a:rPr lang="en-US" altLang="zh-CN" sz="1600" dirty="0"/>
+              <a:t/>
+            </a:r>
+            <a:br>
+              <a:rPr lang="en-US" altLang="zh-CN" sz="1600" dirty="0"/>
+            </a:br>
+            <a:r>
+              <a:rPr lang="en-US" altLang="zh-CN" sz="1600" dirty="0"/>
+              <a:t>    System.out.println("</a:t>
+            </a:r>
+            <a:r>
+              <a:rPr lang="zh-CN" altLang="en-US" sz="1600" dirty="0"/>
+              <a:t>微信支付使用完毕</a:t>
+            </a:r>
+            <a:r>
+              <a:rPr lang="en-US" altLang="zh-CN" sz="1600" dirty="0" smtClean="0"/>
+              <a:t>...");</a:t>
+            </a:r>
+            <a:endParaRPr lang="en-US" altLang="zh-CN" sz="1600" dirty="0"/>
+          </a:p>
+          <a:p>
+            <a:r>
+              <a:rPr lang="en-US" altLang="zh-CN" sz="1600" dirty="0" smtClean="0"/>
+              <a:t>}</a:t>
+            </a:r>
+            <a:endParaRPr lang="zh-CN" altLang="en-US" sz="1600" dirty="0"/>
+          </a:p>
+        </p:txBody>
+      </p:sp>
+      <p:sp>
+        <p:nvSpPr>
+          <p:cNvPr id="3" name="矩形 2"/>
+          <p:cNvSpPr/>
+          <p:nvPr/>
+        </p:nvSpPr>
+        <p:spPr>
+          <a:xfrm>
+            <a:off x="1399731" y="1261339"/>
+            <a:ext cx="4149586" cy="192686"/>
+          </a:xfrm>
+          <a:prstGeom prst="rect">
+            <a:avLst/>
+          </a:prstGeom>
+          <a:noFill/>
+          <a:ln w="28575">
+            <a:solidFill>
+              <a:srgbClr val="FF0000"/>
+            </a:solidFill>
+            <a:prstDash val="solid"/>
+          </a:ln>
+        </p:spPr>
+        <p:style>
+          <a:lnRef idx="2">
+            <a:schemeClr val="accent1">
+              <a:shade val="50000"/>
+            </a:schemeClr>
+          </a:lnRef>
+          <a:fillRef idx="1">
+            <a:schemeClr val="accent1"/>
+          </a:fillRef>
+          <a:effectRef idx="0">
+            <a:schemeClr val="accent1"/>
+          </a:effectRef>
+          <a:fontRef idx="minor">
+            <a:schemeClr val="lt1"/>
+          </a:fontRef>
+        </p:style>
+        <p:txBody>
+          <a:bodyPr rtlCol="0" anchor="ctr"/>
+          <a:lstStyle/>
+          <a:p>
+            <a:pPr algn="ctr"/>
+            <a:endParaRPr lang="zh-CN" altLang="en-US" sz="1600"/>
+          </a:p>
+        </p:txBody>
+      </p:sp>
+      <p:sp>
+        <p:nvSpPr>
+          <p:cNvPr id="7" name="右大括号 6"/>
+          <p:cNvSpPr/>
+          <p:nvPr/>
+        </p:nvSpPr>
+        <p:spPr>
+          <a:xfrm>
+            <a:off x="5730546" y="772054"/>
+            <a:ext cx="312821" cy="3110245"/>
+          </a:xfrm>
+          <a:prstGeom prst="rightBrace">
+            <a:avLst/>
+          </a:prstGeom>
+        </p:spPr>
+        <p:style>
+          <a:lnRef idx="1">
+            <a:schemeClr val="accent1"/>
+          </a:lnRef>
+          <a:fillRef idx="0">
+            <a:schemeClr val="accent1"/>
+          </a:fillRef>
+          <a:effectRef idx="0">
+            <a:schemeClr val="accent1"/>
+          </a:effectRef>
+          <a:fontRef idx="minor">
+            <a:schemeClr val="tx1"/>
+          </a:fontRef>
+        </p:style>
+        <p:txBody>
+          <a:bodyPr rtlCol="0" anchor="ctr"/>
+          <a:lstStyle/>
+          <a:p>
+            <a:pPr algn="ctr"/>
+            <a:endParaRPr lang="zh-CN" altLang="en-US" sz="1600"/>
+          </a:p>
+        </p:txBody>
+      </p:sp>
+      <p:sp>
+        <p:nvSpPr>
+          <p:cNvPr id="19" name="矩形 18"/>
+          <p:cNvSpPr/>
+          <p:nvPr/>
+        </p:nvSpPr>
+        <p:spPr>
+          <a:xfrm>
+            <a:off x="1399730" y="772054"/>
+            <a:ext cx="4149586" cy="192686"/>
+          </a:xfrm>
+          <a:prstGeom prst="rect">
+            <a:avLst/>
+          </a:prstGeom>
+          <a:noFill/>
+          <a:ln w="28575">
+            <a:solidFill>
+              <a:srgbClr val="FF0000"/>
+            </a:solidFill>
+            <a:prstDash val="solid"/>
+          </a:ln>
+        </p:spPr>
+        <p:style>
+          <a:lnRef idx="2">
+            <a:schemeClr val="accent1">
+              <a:shade val="50000"/>
+            </a:schemeClr>
+          </a:lnRef>
+          <a:fillRef idx="1">
+            <a:schemeClr val="accent1"/>
+          </a:fillRef>
+          <a:effectRef idx="0">
+            <a:schemeClr val="accent1"/>
+          </a:effectRef>
+          <a:fontRef idx="minor">
+            <a:schemeClr val="lt1"/>
+          </a:fontRef>
+        </p:style>
+        <p:txBody>
+          <a:bodyPr rtlCol="0" anchor="ctr"/>
+          <a:lstStyle/>
+          <a:p>
+            <a:pPr algn="ctr"/>
+            <a:endParaRPr lang="zh-CN" altLang="en-US" sz="1600"/>
+          </a:p>
+        </p:txBody>
+      </p:sp>
+      <p:sp>
+        <p:nvSpPr>
+          <p:cNvPr id="20" name="矩形 19"/>
+          <p:cNvSpPr/>
+          <p:nvPr/>
+        </p:nvSpPr>
+        <p:spPr>
+          <a:xfrm>
+            <a:off x="1399731" y="2462392"/>
+            <a:ext cx="4149586" cy="192686"/>
+          </a:xfrm>
+          <a:prstGeom prst="rect">
+            <a:avLst/>
+          </a:prstGeom>
+          <a:noFill/>
+          <a:ln w="28575">
+            <a:solidFill>
+              <a:srgbClr val="FF0000"/>
+            </a:solidFill>
+            <a:prstDash val="solid"/>
+          </a:ln>
+        </p:spPr>
+        <p:style>
+          <a:lnRef idx="2">
+            <a:schemeClr val="accent1">
+              <a:shade val="50000"/>
+            </a:schemeClr>
+          </a:lnRef>
+          <a:fillRef idx="1">
+            <a:schemeClr val="accent1"/>
+          </a:fillRef>
+          <a:effectRef idx="0">
+            <a:schemeClr val="accent1"/>
+          </a:effectRef>
+          <a:fontRef idx="minor">
+            <a:schemeClr val="lt1"/>
+          </a:fontRef>
+        </p:style>
+        <p:txBody>
+          <a:bodyPr rtlCol="0" anchor="ctr"/>
+          <a:lstStyle/>
+          <a:p>
+            <a:pPr algn="ctr"/>
+            <a:endParaRPr lang="zh-CN" altLang="en-US" sz="1600"/>
+          </a:p>
+        </p:txBody>
+      </p:sp>
+      <p:sp>
+        <p:nvSpPr>
+          <p:cNvPr id="21" name="矩形 20"/>
+          <p:cNvSpPr/>
+          <p:nvPr/>
+        </p:nvSpPr>
+        <p:spPr>
+          <a:xfrm>
+            <a:off x="1399730" y="1973107"/>
+            <a:ext cx="4149586" cy="192686"/>
+          </a:xfrm>
+          <a:prstGeom prst="rect">
+            <a:avLst/>
+          </a:prstGeom>
+          <a:noFill/>
+          <a:ln w="28575">
+            <a:solidFill>
+              <a:srgbClr val="FF0000"/>
+            </a:solidFill>
+            <a:prstDash val="solid"/>
+          </a:ln>
+        </p:spPr>
+        <p:style>
+          <a:lnRef idx="2">
+            <a:schemeClr val="accent1">
+              <a:shade val="50000"/>
+            </a:schemeClr>
+          </a:lnRef>
+          <a:fillRef idx="1">
+            <a:schemeClr val="accent1"/>
+          </a:fillRef>
+          <a:effectRef idx="0">
+            <a:schemeClr val="accent1"/>
+          </a:effectRef>
+          <a:fontRef idx="minor">
+            <a:schemeClr val="lt1"/>
+          </a:fontRef>
+        </p:style>
+        <p:txBody>
+          <a:bodyPr rtlCol="0" anchor="ctr"/>
+          <a:lstStyle/>
+          <a:p>
+            <a:pPr algn="ctr"/>
+            <a:endParaRPr lang="zh-CN" altLang="en-US" sz="1600"/>
+          </a:p>
+        </p:txBody>
+      </p:sp>
+      <p:sp>
+        <p:nvSpPr>
+          <p:cNvPr id="12" name="文本框 11"/>
+          <p:cNvSpPr txBox="1"/>
+          <p:nvPr/>
+        </p:nvSpPr>
+        <p:spPr>
+          <a:xfrm>
+            <a:off x="6330870" y="2142510"/>
+            <a:ext cx="2723823" cy="369332"/>
+          </a:xfrm>
+          <a:prstGeom prst="rect">
+            <a:avLst/>
+          </a:prstGeom>
+          <a:noFill/>
+        </p:spPr>
+        <p:txBody>
+          <a:bodyPr wrap="none" rtlCol="0">
+            <a:spAutoFit/>
+          </a:bodyPr>
+          <a:lstStyle/>
+          <a:p>
+            <a:r>
+              <a:rPr lang="zh-CN" altLang="en-US" dirty="0" smtClean="0"/>
+              <a:t>重复的代理类的日志代码</a:t>
+            </a:r>
+            <a:endParaRPr lang="zh-CN" altLang="en-US" dirty="0"/>
+          </a:p>
+        </p:txBody>
+      </p:sp>
+      <p:sp>
+        <p:nvSpPr>
+          <p:cNvPr id="24" name="矩形 23"/>
+          <p:cNvSpPr/>
+          <p:nvPr/>
+        </p:nvSpPr>
+        <p:spPr>
+          <a:xfrm>
+            <a:off x="1399731" y="3689613"/>
+            <a:ext cx="4149586" cy="192686"/>
+          </a:xfrm>
+          <a:prstGeom prst="rect">
+            <a:avLst/>
+          </a:prstGeom>
+          <a:noFill/>
+          <a:ln w="28575">
+            <a:solidFill>
+              <a:srgbClr val="FF0000"/>
+            </a:solidFill>
+            <a:prstDash val="solid"/>
+          </a:ln>
+        </p:spPr>
+        <p:style>
+          <a:lnRef idx="2">
+            <a:schemeClr val="accent1">
+              <a:shade val="50000"/>
+            </a:schemeClr>
+          </a:lnRef>
+          <a:fillRef idx="1">
+            <a:schemeClr val="accent1"/>
+          </a:fillRef>
+          <a:effectRef idx="0">
+            <a:schemeClr val="accent1"/>
+          </a:effectRef>
+          <a:fontRef idx="minor">
+            <a:schemeClr val="lt1"/>
+          </a:fontRef>
+        </p:style>
+        <p:txBody>
+          <a:bodyPr rtlCol="0" anchor="ctr"/>
+          <a:lstStyle/>
+          <a:p>
+            <a:pPr algn="ctr"/>
+            <a:endParaRPr lang="zh-CN" altLang="en-US" sz="1600"/>
+          </a:p>
+        </p:txBody>
+      </p:sp>
+      <p:sp>
+        <p:nvSpPr>
+          <p:cNvPr id="25" name="矩形 24"/>
+          <p:cNvSpPr/>
+          <p:nvPr/>
+        </p:nvSpPr>
+        <p:spPr>
+          <a:xfrm>
+            <a:off x="1399730" y="3200328"/>
+            <a:ext cx="4149586" cy="192686"/>
+          </a:xfrm>
+          <a:prstGeom prst="rect">
+            <a:avLst/>
+          </a:prstGeom>
+          <a:noFill/>
+          <a:ln w="28575">
+            <a:solidFill>
+              <a:srgbClr val="FF0000"/>
+            </a:solidFill>
+            <a:prstDash val="solid"/>
+          </a:ln>
+        </p:spPr>
+        <p:style>
+          <a:lnRef idx="2">
+            <a:schemeClr val="accent1">
+              <a:shade val="50000"/>
+            </a:schemeClr>
+          </a:lnRef>
+          <a:fillRef idx="1">
+            <a:schemeClr val="accent1"/>
+          </a:fillRef>
+          <a:effectRef idx="0">
+            <a:schemeClr val="accent1"/>
+          </a:effectRef>
+          <a:fontRef idx="minor">
+            <a:schemeClr val="lt1"/>
+          </a:fontRef>
+        </p:style>
+        <p:txBody>
+          <a:bodyPr rtlCol="0" anchor="ctr"/>
+          <a:lstStyle/>
+          <a:p>
+            <a:pPr algn="ctr"/>
+            <a:endParaRPr lang="zh-CN" altLang="en-US" sz="1600"/>
+          </a:p>
+        </p:txBody>
+      </p:sp>
+    </p:spTree>
+    <p:extLst>
+      <p:ext uri="{BB962C8B-B14F-4D97-AF65-F5344CB8AC3E}">
+        <p14:creationId xmlns:p14="http://schemas.microsoft.com/office/powerpoint/2010/main" val="1407868013"/>
+      </p:ext>
+    </p:extLst>
+  </p:cSld>
+  <p:clrMapOvr>
+    <a:masterClrMapping/>
+  </p:clrMapOvr>
+  <p:timing>
+    <p:tnLst>
+      <p:par>
+        <p:cTn id="1" dur="indefinite" restart="never" nodeType="tmRoot"/>
+      </p:par>
+    </p:tnLst>
+  </p:timing>
+</p:sld>
+</file>
+
+<file path=ppt/slides/slide6.xml><?xml version="1.0" encoding="utf-8"?>
+<p:sld xmlns:a="http://schemas.openxmlformats.org/drawingml/2006/main" xmlns:r="http://schemas.openxmlformats.org/officeDocument/2006/relationships" xmlns:p="http://schemas.openxmlformats.org/presentationml/2006/main">
+  <p:cSld>
+    <p:spTree>
+      <p:nvGrpSpPr>
+        <p:cNvPr id="1" name=""/>
+        <p:cNvGrpSpPr/>
+        <p:nvPr/>
+      </p:nvGrpSpPr>
+      <p:grpSpPr>
+        <a:xfrm>
+          <a:off x="0" y="0"/>
+          <a:ext cx="0" cy="0"/>
+          <a:chOff x="0" y="0"/>
+          <a:chExt cx="0" cy="0"/>
+        </a:xfrm>
+      </p:grpSpPr>
+      <p:sp>
+        <p:nvSpPr>
+          <p:cNvPr id="4" name="圆角矩形 3"/>
+          <p:cNvSpPr/>
+          <p:nvPr/>
+        </p:nvSpPr>
+        <p:spPr>
+          <a:xfrm>
+            <a:off x="1921259" y="1218959"/>
+            <a:ext cx="1796716" cy="673769"/>
+          </a:xfrm>
+          <a:prstGeom prst="roundRect">
+            <a:avLst/>
+          </a:prstGeom>
+        </p:spPr>
+        <p:style>
+          <a:lnRef idx="0">
+            <a:schemeClr val="accent1"/>
+          </a:lnRef>
+          <a:fillRef idx="3">
+            <a:schemeClr val="accent1"/>
+          </a:fillRef>
+          <a:effectRef idx="3">
+            <a:schemeClr val="accent1"/>
+          </a:effectRef>
+          <a:fontRef idx="minor">
+            <a:schemeClr val="lt1"/>
+          </a:fontRef>
+        </p:style>
+        <p:txBody>
+          <a:bodyPr rtlCol="0" anchor="ctr"/>
+          <a:lstStyle/>
+          <a:p>
+            <a:pPr algn="ctr"/>
+            <a:r>
+              <a:rPr lang="en-US" altLang="zh-CN" sz="1400" dirty="0" smtClean="0">
+                <a:solidFill>
+                  <a:schemeClr val="tx1">
+                    <a:lumMod val="95000"/>
+                    <a:lumOff val="5000"/>
+                  </a:schemeClr>
+                </a:solidFill>
+              </a:rPr>
+              <a:t>&lt;&lt;interface&gt;&gt;</a:t>
+            </a:r>
+          </a:p>
+          <a:p>
+            <a:pPr algn="ctr"/>
+            <a:r>
+              <a:rPr lang="en-US" altLang="zh-CN" sz="1400" dirty="0" smtClean="0">
+                <a:solidFill>
+                  <a:schemeClr val="tx1">
+                    <a:lumMod val="95000"/>
+                    <a:lumOff val="5000"/>
+                  </a:schemeClr>
+                </a:solidFill>
+              </a:rPr>
+              <a:t>Security</a:t>
+            </a:r>
+          </a:p>
+          <a:p>
+            <a:pPr algn="ctr"/>
+            <a:r>
+              <a:rPr lang="en-US" altLang="zh-CN" sz="1400" dirty="0" smtClean="0">
+                <a:solidFill>
+                  <a:schemeClr val="tx1">
+                    <a:lumMod val="95000"/>
+                    <a:lumOff val="5000"/>
+                  </a:schemeClr>
+                </a:solidFill>
+              </a:rPr>
+              <a:t>pass()</a:t>
+            </a:r>
+            <a:endParaRPr lang="zh-CN" altLang="en-US" sz="1400" dirty="0">
+              <a:solidFill>
+                <a:schemeClr val="tx1">
+                  <a:lumMod val="95000"/>
+                  <a:lumOff val="5000"/>
+                </a:schemeClr>
+              </a:solidFill>
+            </a:endParaRPr>
+          </a:p>
+        </p:txBody>
+      </p:sp>
+      <p:sp>
+        <p:nvSpPr>
+          <p:cNvPr id="5" name="矩形 4"/>
+          <p:cNvSpPr/>
+          <p:nvPr/>
+        </p:nvSpPr>
+        <p:spPr>
+          <a:xfrm>
+            <a:off x="1921259" y="2186294"/>
+            <a:ext cx="1796716" cy="794085"/>
+          </a:xfrm>
+          <a:prstGeom prst="rect">
+            <a:avLst/>
+          </a:prstGeom>
+        </p:spPr>
+        <p:style>
+          <a:lnRef idx="0">
+            <a:schemeClr val="accent6"/>
+          </a:lnRef>
+          <a:fillRef idx="3">
+            <a:schemeClr val="accent6"/>
+          </a:fillRef>
+          <a:effectRef idx="3">
+            <a:schemeClr val="accent6"/>
+          </a:effectRef>
+          <a:fontRef idx="minor">
+            <a:schemeClr val="lt1"/>
+          </a:fontRef>
+        </p:style>
+        <p:txBody>
+          <a:bodyPr rtlCol="0" anchor="ctr"/>
+          <a:lstStyle/>
+          <a:p>
+            <a:pPr algn="ctr"/>
+            <a:r>
+              <a:rPr lang="en-US" altLang="zh-CN" sz="1600" b="1" dirty="0">
+                <a:solidFill>
+                  <a:schemeClr val="tx1">
+                    <a:lumMod val="95000"/>
+                    <a:lumOff val="5000"/>
+                  </a:schemeClr>
+                </a:solidFill>
+              </a:rPr>
+              <a:t>Passenger</a:t>
+            </a:r>
+          </a:p>
+          <a:p>
+            <a:pPr algn="ctr"/>
+            <a:r>
+              <a:rPr lang="en-US" altLang="zh-CN" sz="1600" b="1" dirty="0">
+                <a:solidFill>
+                  <a:schemeClr val="tx1">
+                    <a:lumMod val="95000"/>
+                    <a:lumOff val="5000"/>
+                  </a:schemeClr>
+                </a:solidFill>
+              </a:rPr>
+              <a:t>pass()</a:t>
+            </a:r>
+            <a:endParaRPr lang="zh-CN" altLang="en-US" sz="1600" b="1" dirty="0">
+              <a:solidFill>
+                <a:schemeClr val="tx1">
+                  <a:lumMod val="95000"/>
+                  <a:lumOff val="5000"/>
+                </a:schemeClr>
+              </a:solidFill>
+            </a:endParaRPr>
+          </a:p>
+        </p:txBody>
+      </p:sp>
+      <p:sp>
+        <p:nvSpPr>
+          <p:cNvPr id="6" name="矩形 5"/>
+          <p:cNvSpPr/>
+          <p:nvPr/>
+        </p:nvSpPr>
+        <p:spPr>
+          <a:xfrm>
+            <a:off x="1921259" y="3510832"/>
+            <a:ext cx="1796716" cy="821796"/>
+          </a:xfrm>
+          <a:prstGeom prst="rect">
+            <a:avLst/>
+          </a:prstGeom>
+        </p:spPr>
+        <p:style>
+          <a:lnRef idx="0">
+            <a:schemeClr val="accent2"/>
+          </a:lnRef>
+          <a:fillRef idx="3">
+            <a:schemeClr val="accent2"/>
+          </a:fillRef>
+          <a:effectRef idx="3">
+            <a:schemeClr val="accent2"/>
+          </a:effectRef>
+          <a:fontRef idx="minor">
+            <a:schemeClr val="lt1"/>
+          </a:fontRef>
+        </p:style>
+        <p:txBody>
+          <a:bodyPr rtlCol="0" anchor="ctr"/>
+          <a:lstStyle/>
+          <a:p>
+            <a:pPr algn="ctr"/>
+            <a:endParaRPr lang="en-US" altLang="zh-CN" dirty="0" smtClean="0">
+              <a:solidFill>
+                <a:schemeClr val="tx1">
+                  <a:lumMod val="95000"/>
+                  <a:lumOff val="5000"/>
+                </a:schemeClr>
+              </a:solidFill>
+            </a:endParaRPr>
+          </a:p>
+          <a:p>
+            <a:pPr algn="ctr"/>
+            <a:r>
+              <a:rPr lang="en-US" altLang="zh-CN" sz="1600" b="1" dirty="0" smtClean="0">
+                <a:solidFill>
+                  <a:schemeClr val="tx1">
+                    <a:lumMod val="95000"/>
+                    <a:lumOff val="5000"/>
+                  </a:schemeClr>
+                </a:solidFill>
+              </a:rPr>
+              <a:t>$Proxy0</a:t>
+            </a:r>
+            <a:endParaRPr lang="en-US" altLang="zh-CN" sz="1600" b="1" dirty="0">
+              <a:solidFill>
+                <a:schemeClr val="tx1">
+                  <a:lumMod val="95000"/>
+                  <a:lumOff val="5000"/>
+                </a:schemeClr>
+              </a:solidFill>
+            </a:endParaRPr>
+          </a:p>
+          <a:p>
+            <a:pPr algn="ctr"/>
+            <a:r>
+              <a:rPr lang="en-US" altLang="zh-CN" sz="1600" b="1" dirty="0">
+                <a:solidFill>
+                  <a:schemeClr val="tx1">
+                    <a:lumMod val="95000"/>
+                    <a:lumOff val="5000"/>
+                  </a:schemeClr>
+                </a:solidFill>
+              </a:rPr>
+              <a:t>pass()</a:t>
+            </a:r>
+            <a:endParaRPr lang="zh-CN" altLang="en-US" sz="1600" b="1" dirty="0">
+              <a:solidFill>
+                <a:schemeClr val="tx1">
+                  <a:lumMod val="95000"/>
+                  <a:lumOff val="5000"/>
+                </a:schemeClr>
+              </a:solidFill>
+            </a:endParaRPr>
+          </a:p>
+          <a:p>
+            <a:pPr algn="ctr"/>
+            <a:endParaRPr lang="zh-CN" altLang="en-US" dirty="0">
+              <a:solidFill>
+                <a:schemeClr val="tx1">
+                  <a:lumMod val="95000"/>
+                  <a:lumOff val="5000"/>
+                </a:schemeClr>
+              </a:solidFill>
+            </a:endParaRPr>
+          </a:p>
+        </p:txBody>
+      </p:sp>
+      <p:cxnSp>
+        <p:nvCxnSpPr>
+          <p:cNvPr id="8" name="直接箭头连接符 7"/>
+          <p:cNvCxnSpPr>
+            <a:stCxn id="5" idx="0"/>
+            <a:endCxn id="4" idx="2"/>
+          </p:cNvCxnSpPr>
+          <p:nvPr/>
+        </p:nvCxnSpPr>
+        <p:spPr>
+          <a:xfrm flipV="1">
+            <a:off x="2819617" y="1892728"/>
+            <a:ext cx="0" cy="293566"/>
+          </a:xfrm>
+          <a:prstGeom prst="straightConnector1">
+            <a:avLst/>
+          </a:prstGeom>
+          <a:ln w="12700">
+            <a:prstDash val="dash"/>
+            <a:tailEnd type="triangle"/>
+          </a:ln>
+        </p:spPr>
+        <p:style>
+          <a:lnRef idx="1">
+            <a:schemeClr val="accent1"/>
+          </a:lnRef>
+          <a:fillRef idx="0">
+            <a:schemeClr val="accent1"/>
+          </a:fillRef>
+          <a:effectRef idx="0">
+            <a:schemeClr val="accent1"/>
+          </a:effectRef>
+          <a:fontRef idx="minor">
+            <a:schemeClr val="tx1"/>
+          </a:fontRef>
+        </p:style>
+      </p:cxnSp>
+      <p:cxnSp>
+        <p:nvCxnSpPr>
+          <p:cNvPr id="16" name="直接箭头连接符 15"/>
+          <p:cNvCxnSpPr>
+            <a:stCxn id="6" idx="0"/>
+            <a:endCxn id="5" idx="2"/>
+          </p:cNvCxnSpPr>
+          <p:nvPr/>
+        </p:nvCxnSpPr>
+        <p:spPr>
+          <a:xfrm flipV="1">
+            <a:off x="2819617" y="2980379"/>
+            <a:ext cx="0" cy="530453"/>
+          </a:xfrm>
+          <a:prstGeom prst="straightConnector1">
+            <a:avLst/>
+          </a:prstGeom>
+          <a:ln>
+            <a:tailEnd type="triangle"/>
+          </a:ln>
+        </p:spPr>
+        <p:style>
+          <a:lnRef idx="1">
+            <a:schemeClr val="accent1"/>
+          </a:lnRef>
+          <a:fillRef idx="0">
+            <a:schemeClr val="accent1"/>
+          </a:fillRef>
+          <a:effectRef idx="0">
+            <a:schemeClr val="accent1"/>
+          </a:effectRef>
+          <a:fontRef idx="minor">
+            <a:schemeClr val="tx1"/>
+          </a:fontRef>
+        </p:style>
+      </p:cxnSp>
+      <p:sp>
+        <p:nvSpPr>
+          <p:cNvPr id="17" name="文本框 16"/>
+          <p:cNvSpPr txBox="1"/>
+          <p:nvPr/>
+        </p:nvSpPr>
+        <p:spPr>
+          <a:xfrm>
+            <a:off x="2972522" y="3060939"/>
+            <a:ext cx="685798" cy="369332"/>
+          </a:xfrm>
+          <a:prstGeom prst="rect">
+            <a:avLst/>
+          </a:prstGeom>
+          <a:noFill/>
+        </p:spPr>
+        <p:txBody>
+          <a:bodyPr wrap="square" rtlCol="0">
+            <a:spAutoFit/>
+          </a:bodyPr>
+          <a:lstStyle/>
+          <a:p>
+            <a:r>
+              <a:rPr lang="zh-CN" altLang="en-US" dirty="0">
+                <a:solidFill>
+                  <a:schemeClr val="tx1">
+                    <a:lumMod val="95000"/>
+                    <a:lumOff val="5000"/>
+                  </a:schemeClr>
+                </a:solidFill>
+              </a:rPr>
+              <a:t>代理</a:t>
+            </a:r>
+          </a:p>
+        </p:txBody>
+      </p:sp>
+      <p:sp>
+        <p:nvSpPr>
+          <p:cNvPr id="9" name="圆角矩形 8"/>
+          <p:cNvSpPr/>
+          <p:nvPr/>
+        </p:nvSpPr>
+        <p:spPr>
+          <a:xfrm>
+            <a:off x="4630285" y="1218958"/>
+            <a:ext cx="1677404" cy="673769"/>
+          </a:xfrm>
+          <a:prstGeom prst="roundRect">
+            <a:avLst/>
+          </a:prstGeom>
+        </p:spPr>
+        <p:style>
+          <a:lnRef idx="0">
+            <a:schemeClr val="accent1"/>
+          </a:lnRef>
+          <a:fillRef idx="3">
+            <a:schemeClr val="accent1"/>
+          </a:fillRef>
+          <a:effectRef idx="3">
+            <a:schemeClr val="accent1"/>
+          </a:effectRef>
+          <a:fontRef idx="minor">
+            <a:schemeClr val="lt1"/>
+          </a:fontRef>
+        </p:style>
+        <p:txBody>
+          <a:bodyPr rtlCol="0" anchor="ctr"/>
+          <a:lstStyle/>
+          <a:p>
+            <a:pPr algn="ctr"/>
+            <a:r>
+              <a:rPr lang="en-US" altLang="zh-CN" sz="1400" dirty="0" smtClean="0">
+                <a:solidFill>
+                  <a:schemeClr val="tx1">
+                    <a:lumMod val="95000"/>
+                    <a:lumOff val="5000"/>
+                  </a:schemeClr>
+                </a:solidFill>
+              </a:rPr>
+              <a:t>&lt;&lt;interface&gt;&gt;</a:t>
+            </a:r>
+          </a:p>
+          <a:p>
+            <a:pPr algn="ctr"/>
+            <a:r>
+              <a:rPr lang="en-US" altLang="zh-CN" sz="1400" dirty="0" smtClean="0">
+                <a:solidFill>
+                  <a:schemeClr val="tx1">
+                    <a:lumMod val="95000"/>
+                    <a:lumOff val="5000"/>
+                  </a:schemeClr>
+                </a:solidFill>
+              </a:rPr>
+              <a:t>InvocationHandler</a:t>
+            </a:r>
+          </a:p>
+          <a:p>
+            <a:pPr algn="ctr"/>
+            <a:r>
+              <a:rPr lang="en-US" altLang="zh-CN" sz="1400" dirty="0" smtClean="0">
+                <a:solidFill>
+                  <a:schemeClr val="tx1">
+                    <a:lumMod val="95000"/>
+                    <a:lumOff val="5000"/>
+                  </a:schemeClr>
+                </a:solidFill>
+              </a:rPr>
+              <a:t>invoke()</a:t>
+            </a:r>
+            <a:endParaRPr lang="zh-CN" altLang="en-US" sz="1400" dirty="0">
+              <a:solidFill>
+                <a:schemeClr val="tx1">
+                  <a:lumMod val="95000"/>
+                  <a:lumOff val="5000"/>
+                </a:schemeClr>
+              </a:solidFill>
+            </a:endParaRPr>
+          </a:p>
+        </p:txBody>
+      </p:sp>
+      <p:sp>
+        <p:nvSpPr>
+          <p:cNvPr id="18" name="矩形 17"/>
+          <p:cNvSpPr/>
+          <p:nvPr/>
+        </p:nvSpPr>
+        <p:spPr>
+          <a:xfrm>
+            <a:off x="4491360" y="4948705"/>
+            <a:ext cx="1955254" cy="794085"/>
+          </a:xfrm>
+          <a:prstGeom prst="rect">
+            <a:avLst/>
+          </a:prstGeom>
+        </p:spPr>
+        <p:style>
+          <a:lnRef idx="0">
+            <a:schemeClr val="accent4"/>
+          </a:lnRef>
+          <a:fillRef idx="3">
+            <a:schemeClr val="accent4"/>
+          </a:fillRef>
+          <a:effectRef idx="3">
+            <a:schemeClr val="accent4"/>
+          </a:effectRef>
+          <a:fontRef idx="minor">
+            <a:schemeClr val="lt1"/>
+          </a:fontRef>
+        </p:style>
+        <p:txBody>
+          <a:bodyPr rtlCol="0" anchor="ctr"/>
+          <a:lstStyle/>
+          <a:p>
+            <a:pPr algn="ctr"/>
+            <a:r>
+              <a:rPr lang="en-US" altLang="zh-CN" sz="1600" b="1" dirty="0" smtClean="0">
+                <a:solidFill>
+                  <a:schemeClr val="tx1">
+                    <a:lumMod val="95000"/>
+                    <a:lumOff val="5000"/>
+                  </a:schemeClr>
+                </a:solidFill>
+              </a:rPr>
+              <a:t>AutoSecurity-CheckMachine</a:t>
+            </a:r>
+            <a:endParaRPr lang="en-US" altLang="zh-CN" sz="1600" b="1" dirty="0">
+              <a:solidFill>
+                <a:schemeClr val="tx1">
+                  <a:lumMod val="95000"/>
+                  <a:lumOff val="5000"/>
+                </a:schemeClr>
+              </a:solidFill>
+            </a:endParaRPr>
+          </a:p>
+          <a:p>
+            <a:pPr algn="ctr"/>
+            <a:r>
+              <a:rPr lang="en-US" altLang="zh-CN" sz="1600" b="1" dirty="0">
+                <a:solidFill>
+                  <a:schemeClr val="tx1">
+                    <a:lumMod val="95000"/>
+                    <a:lumOff val="5000"/>
+                  </a:schemeClr>
+                </a:solidFill>
+              </a:rPr>
+              <a:t>invoke()</a:t>
+            </a:r>
+            <a:endParaRPr lang="zh-CN" altLang="en-US" sz="1600" b="1" dirty="0">
+              <a:solidFill>
+                <a:schemeClr val="tx1">
+                  <a:lumMod val="95000"/>
+                  <a:lumOff val="5000"/>
+                </a:schemeClr>
+              </a:solidFill>
+            </a:endParaRPr>
+          </a:p>
+        </p:txBody>
+      </p:sp>
+      <p:cxnSp>
+        <p:nvCxnSpPr>
+          <p:cNvPr id="19" name="直接箭头连接符 18"/>
+          <p:cNvCxnSpPr>
+            <a:stCxn id="18" idx="0"/>
+            <a:endCxn id="9" idx="2"/>
+          </p:cNvCxnSpPr>
+          <p:nvPr/>
+        </p:nvCxnSpPr>
+        <p:spPr>
+          <a:xfrm flipV="1">
+            <a:off x="5468987" y="1892727"/>
+            <a:ext cx="0" cy="3055978"/>
+          </a:xfrm>
+          <a:prstGeom prst="straightConnector1">
+            <a:avLst/>
+          </a:prstGeom>
+          <a:ln w="12700">
+            <a:prstDash val="dash"/>
+            <a:tailEnd type="triangle"/>
+          </a:ln>
+        </p:spPr>
+        <p:style>
+          <a:lnRef idx="1">
+            <a:schemeClr val="accent1"/>
+          </a:lnRef>
+          <a:fillRef idx="0">
+            <a:schemeClr val="accent1"/>
+          </a:fillRef>
+          <a:effectRef idx="0">
+            <a:schemeClr val="accent1"/>
+          </a:effectRef>
+          <a:fontRef idx="minor">
+            <a:schemeClr val="tx1"/>
+          </a:fontRef>
+        </p:style>
+      </p:cxnSp>
+      <p:cxnSp>
+        <p:nvCxnSpPr>
+          <p:cNvPr id="23" name="直接箭头连接符 22"/>
+          <p:cNvCxnSpPr>
+            <a:stCxn id="24" idx="0"/>
+            <a:endCxn id="6" idx="2"/>
+          </p:cNvCxnSpPr>
+          <p:nvPr/>
+        </p:nvCxnSpPr>
+        <p:spPr>
+          <a:xfrm flipH="1" flipV="1">
+            <a:off x="2819617" y="4332628"/>
+            <a:ext cx="5661" cy="602222"/>
+          </a:xfrm>
+          <a:prstGeom prst="straightConnector1">
+            <a:avLst/>
+          </a:prstGeom>
+          <a:ln>
+            <a:tailEnd type="triangle"/>
+          </a:ln>
+        </p:spPr>
+        <p:style>
+          <a:lnRef idx="1">
+            <a:schemeClr val="accent1"/>
+          </a:lnRef>
+          <a:fillRef idx="0">
+            <a:schemeClr val="accent1"/>
+          </a:fillRef>
+          <a:effectRef idx="0">
+            <a:schemeClr val="accent1"/>
+          </a:effectRef>
+          <a:fontRef idx="minor">
+            <a:schemeClr val="tx1"/>
+          </a:fontRef>
+        </p:style>
+      </p:cxnSp>
+      <p:sp>
+        <p:nvSpPr>
+          <p:cNvPr id="24" name="矩形 23"/>
+          <p:cNvSpPr/>
+          <p:nvPr/>
+        </p:nvSpPr>
+        <p:spPr>
+          <a:xfrm>
+            <a:off x="1847651" y="4934850"/>
+            <a:ext cx="1955254" cy="821797"/>
+          </a:xfrm>
+          <a:prstGeom prst="rect">
+            <a:avLst/>
+          </a:prstGeom>
+        </p:spPr>
+        <p:style>
+          <a:lnRef idx="0">
+            <a:schemeClr val="accent2"/>
+          </a:lnRef>
+          <a:fillRef idx="3">
+            <a:schemeClr val="accent2"/>
+          </a:fillRef>
+          <a:effectRef idx="3">
+            <a:schemeClr val="accent2"/>
+          </a:effectRef>
+          <a:fontRef idx="minor">
+            <a:schemeClr val="lt1"/>
+          </a:fontRef>
+        </p:style>
+        <p:txBody>
+          <a:bodyPr rtlCol="0" anchor="ctr"/>
+          <a:lstStyle/>
+          <a:p>
+            <a:pPr algn="ctr"/>
+            <a:r>
+              <a:rPr lang="en-US" altLang="zh-CN" sz="1600" b="1" dirty="0">
+                <a:solidFill>
+                  <a:schemeClr val="tx1">
+                    <a:lumMod val="95000"/>
+                    <a:lumOff val="5000"/>
+                  </a:schemeClr>
+                </a:solidFill>
+              </a:rPr>
+              <a:t>Proxy</a:t>
+            </a:r>
+          </a:p>
+          <a:p>
+            <a:pPr algn="ctr"/>
+            <a:r>
+              <a:rPr lang="en-US" altLang="zh-CN" sz="1600" b="1" dirty="0">
+                <a:solidFill>
+                  <a:schemeClr val="tx1">
+                    <a:lumMod val="95000"/>
+                    <a:lumOff val="5000"/>
+                  </a:schemeClr>
+                </a:solidFill>
+              </a:rPr>
+              <a:t>newProxyInstance()</a:t>
+            </a:r>
+            <a:endParaRPr lang="zh-CN" altLang="en-US" sz="1600" b="1" dirty="0">
+              <a:solidFill>
+                <a:schemeClr val="tx1">
+                  <a:lumMod val="95000"/>
+                  <a:lumOff val="5000"/>
+                </a:schemeClr>
+              </a:solidFill>
+            </a:endParaRPr>
+          </a:p>
+        </p:txBody>
+      </p:sp>
+      <p:cxnSp>
+        <p:nvCxnSpPr>
+          <p:cNvPr id="31" name="直接箭头连接符 30"/>
+          <p:cNvCxnSpPr>
+            <a:stCxn id="24" idx="3"/>
+            <a:endCxn id="18" idx="1"/>
+          </p:cNvCxnSpPr>
+          <p:nvPr/>
+        </p:nvCxnSpPr>
+        <p:spPr>
+          <a:xfrm flipV="1">
+            <a:off x="3802905" y="5345748"/>
+            <a:ext cx="688455" cy="1"/>
+          </a:xfrm>
+          <a:prstGeom prst="straightConnector1">
+            <a:avLst/>
+          </a:prstGeom>
+          <a:ln>
+            <a:tailEnd type="triangle"/>
+          </a:ln>
+        </p:spPr>
+        <p:style>
+          <a:lnRef idx="1">
+            <a:schemeClr val="accent1"/>
+          </a:lnRef>
+          <a:fillRef idx="0">
+            <a:schemeClr val="accent1"/>
+          </a:fillRef>
+          <a:effectRef idx="0">
+            <a:schemeClr val="accent1"/>
+          </a:effectRef>
+          <a:fontRef idx="minor">
+            <a:schemeClr val="tx1"/>
+          </a:fontRef>
+        </p:style>
+      </p:cxnSp>
+      <p:sp>
+        <p:nvSpPr>
+          <p:cNvPr id="44" name="文本框 43"/>
+          <p:cNvSpPr txBox="1"/>
+          <p:nvPr/>
+        </p:nvSpPr>
+        <p:spPr>
+          <a:xfrm>
+            <a:off x="1652322" y="4502191"/>
+            <a:ext cx="1107846" cy="369332"/>
+          </a:xfrm>
+          <a:prstGeom prst="rect">
+            <a:avLst/>
+          </a:prstGeom>
+          <a:noFill/>
+        </p:spPr>
+        <p:txBody>
+          <a:bodyPr wrap="square" rtlCol="0">
+            <a:spAutoFit/>
+          </a:bodyPr>
+          <a:lstStyle/>
+          <a:p>
+            <a:r>
+              <a:rPr lang="zh-CN" altLang="en-US" dirty="0" smtClean="0"/>
+              <a:t>动态生成</a:t>
+            </a:r>
+            <a:endParaRPr lang="zh-CN" altLang="en-US" dirty="0"/>
+          </a:p>
+        </p:txBody>
+      </p:sp>
+      <p:sp>
+        <p:nvSpPr>
+          <p:cNvPr id="45" name="文本框 44"/>
+          <p:cNvSpPr txBox="1"/>
+          <p:nvPr/>
+        </p:nvSpPr>
+        <p:spPr>
+          <a:xfrm>
+            <a:off x="630742" y="3871214"/>
+            <a:ext cx="1466057" cy="369332"/>
+          </a:xfrm>
+          <a:prstGeom prst="rect">
+            <a:avLst/>
+          </a:prstGeom>
+          <a:noFill/>
+        </p:spPr>
+        <p:txBody>
+          <a:bodyPr wrap="square" rtlCol="0">
+            <a:spAutoFit/>
+          </a:bodyPr>
+          <a:lstStyle/>
+          <a:p>
+            <a:r>
+              <a:rPr lang="zh-CN" altLang="en-US" dirty="0" smtClean="0"/>
+              <a:t>临时代理</a:t>
+            </a:r>
+            <a:r>
+              <a:rPr lang="zh-CN" altLang="en-US" dirty="0" smtClean="0"/>
+              <a:t>类</a:t>
+            </a:r>
+            <a:endParaRPr lang="zh-CN" altLang="en-US" dirty="0"/>
+          </a:p>
+        </p:txBody>
+      </p:sp>
+      <p:sp>
+        <p:nvSpPr>
+          <p:cNvPr id="46" name="文本框 45"/>
+          <p:cNvSpPr txBox="1"/>
+          <p:nvPr/>
+        </p:nvSpPr>
+        <p:spPr>
+          <a:xfrm>
+            <a:off x="3861928" y="5394241"/>
+            <a:ext cx="1049035" cy="369332"/>
+          </a:xfrm>
+          <a:prstGeom prst="rect">
+            <a:avLst/>
+          </a:prstGeom>
+          <a:noFill/>
+        </p:spPr>
+        <p:txBody>
+          <a:bodyPr wrap="square" rtlCol="0">
+            <a:spAutoFit/>
+          </a:bodyPr>
+          <a:lstStyle/>
+          <a:p>
+            <a:r>
+              <a:rPr lang="zh-CN" altLang="en-US" dirty="0" smtClean="0"/>
+              <a:t>调用</a:t>
+            </a:r>
+            <a:endParaRPr lang="zh-CN" altLang="en-US" dirty="0"/>
+          </a:p>
+        </p:txBody>
+      </p:sp>
+      <p:sp>
+        <p:nvSpPr>
+          <p:cNvPr id="105" name="文本框 104"/>
+          <p:cNvSpPr txBox="1"/>
+          <p:nvPr/>
+        </p:nvSpPr>
+        <p:spPr>
+          <a:xfrm>
+            <a:off x="5513942" y="4449073"/>
+            <a:ext cx="1587493" cy="369332"/>
+          </a:xfrm>
+          <a:prstGeom prst="rect">
+            <a:avLst/>
+          </a:prstGeom>
+          <a:noFill/>
+        </p:spPr>
+        <p:txBody>
+          <a:bodyPr wrap="square" rtlCol="0">
+            <a:spAutoFit/>
+          </a:bodyPr>
+          <a:lstStyle/>
+          <a:p>
+            <a:r>
+              <a:rPr lang="zh-CN" altLang="en-US" dirty="0" smtClean="0"/>
+              <a:t>调用处理器</a:t>
+            </a:r>
+            <a:endParaRPr lang="zh-CN" altLang="en-US" dirty="0"/>
+          </a:p>
+        </p:txBody>
+      </p:sp>
+      <p:sp>
+        <p:nvSpPr>
+          <p:cNvPr id="106" name="文本框 105"/>
+          <p:cNvSpPr txBox="1"/>
+          <p:nvPr/>
+        </p:nvSpPr>
+        <p:spPr>
+          <a:xfrm>
+            <a:off x="5544712" y="1892727"/>
+            <a:ext cx="1803804" cy="369332"/>
+          </a:xfrm>
+          <a:prstGeom prst="rect">
+            <a:avLst/>
+          </a:prstGeom>
+          <a:noFill/>
+        </p:spPr>
+        <p:txBody>
+          <a:bodyPr wrap="square" rtlCol="0">
+            <a:spAutoFit/>
+          </a:bodyPr>
+          <a:lstStyle/>
+          <a:p>
+            <a:r>
+              <a:rPr lang="zh-CN" altLang="en-US" dirty="0" smtClean="0"/>
+              <a:t>调用处理器接口</a:t>
+            </a:r>
+            <a:endParaRPr lang="zh-CN" altLang="en-US" dirty="0"/>
+          </a:p>
+        </p:txBody>
+      </p:sp>
+      <p:cxnSp>
+        <p:nvCxnSpPr>
+          <p:cNvPr id="108" name="肘形连接符 107"/>
+          <p:cNvCxnSpPr>
+            <a:stCxn id="6" idx="3"/>
+            <a:endCxn id="4" idx="3"/>
+          </p:cNvCxnSpPr>
+          <p:nvPr/>
+        </p:nvCxnSpPr>
+        <p:spPr>
+          <a:xfrm flipV="1">
+            <a:off x="3717975" y="1555844"/>
+            <a:ext cx="12700" cy="2365886"/>
+          </a:xfrm>
+          <a:prstGeom prst="bentConnector3">
+            <a:avLst>
+              <a:gd name="adj1" fmla="val 1800000"/>
+            </a:avLst>
+          </a:prstGeom>
+          <a:ln w="12700">
+            <a:prstDash val="dash"/>
+            <a:tailEnd type="triangle"/>
+          </a:ln>
+        </p:spPr>
+        <p:style>
+          <a:lnRef idx="1">
+            <a:schemeClr val="accent1"/>
+          </a:lnRef>
+          <a:fillRef idx="0">
+            <a:schemeClr val="accent1"/>
+          </a:fillRef>
+          <a:effectRef idx="0">
+            <a:schemeClr val="accent1"/>
+          </a:effectRef>
+          <a:fontRef idx="minor">
+            <a:schemeClr val="tx1"/>
+          </a:fontRef>
+        </p:style>
+      </p:cxnSp>
+    </p:spTree>
+    <p:extLst>
+      <p:ext uri="{BB962C8B-B14F-4D97-AF65-F5344CB8AC3E}">
+        <p14:creationId xmlns:p14="http://schemas.microsoft.com/office/powerpoint/2010/main" val="1153273127"/>
+      </p:ext>
+    </p:extLst>
+  </p:cSld>
+  <p:clrMapOvr>
+    <a:masterClrMapping/>
+  </p:clrMapOvr>
+  <p:timing>
+    <p:tnLst>
+      <p:par>
+        <p:cTn id="1" dur="indefinite" restart="never" nodeType="tmRoot"/>
+      </p:par>
+    </p:tnLst>
+  </p:timing>
+</p:sld>
+</file>
+
+<file path=ppt/slides/slide7.xml><?xml version="1.0" encoding="utf-8"?>
+<p:sld xmlns:a="http://schemas.openxmlformats.org/drawingml/2006/main" xmlns:r="http://schemas.openxmlformats.org/officeDocument/2006/relationships" xmlns:p="http://schemas.openxmlformats.org/presentationml/2006/main">
+  <p:cSld>
+    <p:spTree>
+      <p:nvGrpSpPr>
+        <p:cNvPr id="1" name=""/>
+        <p:cNvGrpSpPr/>
+        <p:nvPr/>
+      </p:nvGrpSpPr>
+      <p:grpSpPr>
+        <a:xfrm>
+          <a:off x="0" y="0"/>
+          <a:ext cx="0" cy="0"/>
+          <a:chOff x="0" y="0"/>
+          <a:chExt cx="0" cy="0"/>
+        </a:xfrm>
+      </p:grpSpPr>
+      <p:sp>
+        <p:nvSpPr>
+          <p:cNvPr id="4" name="圆角矩形 3"/>
+          <p:cNvSpPr/>
+          <p:nvPr/>
+        </p:nvSpPr>
+        <p:spPr>
+          <a:xfrm>
+            <a:off x="5975683" y="416092"/>
+            <a:ext cx="2053389" cy="794084"/>
+          </a:xfrm>
+          <a:prstGeom prst="roundRect">
+            <a:avLst/>
+          </a:prstGeom>
+        </p:spPr>
+        <p:style>
+          <a:lnRef idx="2">
+            <a:schemeClr val="accent2">
+              <a:shade val="50000"/>
+            </a:schemeClr>
+          </a:lnRef>
+          <a:fillRef idx="1">
+            <a:schemeClr val="accent2"/>
+          </a:fillRef>
+          <a:effectRef idx="0">
+            <a:schemeClr val="accent2"/>
+          </a:effectRef>
+          <a:fontRef idx="minor">
+            <a:schemeClr val="lt1"/>
+          </a:fontRef>
+        </p:style>
+        <p:txBody>
+          <a:bodyPr rtlCol="0" anchor="ctr"/>
+          <a:lstStyle/>
+          <a:p>
+            <a:pPr algn="ctr"/>
+            <a:r>
+              <a:rPr lang="en-US" altLang="zh-CN" dirty="0" smtClean="0"/>
+              <a:t>Proxy</a:t>
+            </a:r>
+          </a:p>
+          <a:p>
+            <a:pPr algn="ctr"/>
+            <a:r>
+              <a:rPr lang="en-US" altLang="zh-CN" dirty="0" smtClean="0"/>
+              <a:t>.newProxyInstace()</a:t>
+            </a:r>
+            <a:endParaRPr lang="zh-CN" altLang="en-US" dirty="0"/>
+          </a:p>
+        </p:txBody>
+      </p:sp>
+      <p:sp>
+        <p:nvSpPr>
+          <p:cNvPr id="5" name="圆角矩形 4"/>
+          <p:cNvSpPr/>
+          <p:nvPr/>
+        </p:nvSpPr>
+        <p:spPr>
+          <a:xfrm>
+            <a:off x="2598822" y="397041"/>
+            <a:ext cx="2053388" cy="794084"/>
+          </a:xfrm>
+          <a:prstGeom prst="roundRect">
+            <a:avLst/>
+          </a:prstGeom>
+        </p:spPr>
+        <p:style>
+          <a:lnRef idx="2">
+            <a:schemeClr val="accent2">
+              <a:shade val="50000"/>
+            </a:schemeClr>
+          </a:lnRef>
+          <a:fillRef idx="1">
+            <a:schemeClr val="accent2"/>
+          </a:fillRef>
+          <a:effectRef idx="0">
+            <a:schemeClr val="accent2"/>
+          </a:effectRef>
+          <a:fontRef idx="minor">
+            <a:schemeClr val="lt1"/>
+          </a:fontRef>
+        </p:style>
+        <p:txBody>
+          <a:bodyPr rtlCol="0" anchor="ctr"/>
+          <a:lstStyle/>
+          <a:p>
+            <a:pPr algn="ctr"/>
+            <a:r>
+              <a:rPr lang="en-US" altLang="zh-CN" dirty="0" smtClean="0"/>
+              <a:t>cons</a:t>
+            </a:r>
+          </a:p>
+          <a:p>
+            <a:pPr algn="ctr"/>
+            <a:r>
+              <a:rPr lang="en-US" altLang="zh-CN" dirty="0" smtClean="0"/>
+              <a:t>.newInstance(h)</a:t>
+            </a:r>
+            <a:endParaRPr lang="zh-CN" altLang="en-US" dirty="0"/>
+          </a:p>
+        </p:txBody>
+      </p:sp>
+      <p:sp>
+        <p:nvSpPr>
+          <p:cNvPr id="6" name="圆角矩形 5"/>
+          <p:cNvSpPr/>
+          <p:nvPr/>
+        </p:nvSpPr>
+        <p:spPr>
+          <a:xfrm>
+            <a:off x="9649326" y="416092"/>
+            <a:ext cx="2053388" cy="794084"/>
+          </a:xfrm>
+          <a:prstGeom prst="roundRect">
+            <a:avLst/>
+          </a:prstGeom>
+        </p:spPr>
+        <p:style>
+          <a:lnRef idx="2">
+            <a:schemeClr val="accent1">
+              <a:shade val="50000"/>
+            </a:schemeClr>
+          </a:lnRef>
+          <a:fillRef idx="1">
+            <a:schemeClr val="accent1"/>
+          </a:fillRef>
+          <a:effectRef idx="0">
+            <a:schemeClr val="accent1"/>
+          </a:effectRef>
+          <a:fontRef idx="minor">
+            <a:schemeClr val="lt1"/>
+          </a:fontRef>
+        </p:style>
+        <p:txBody>
+          <a:bodyPr rtlCol="0" anchor="ctr"/>
+          <a:lstStyle/>
+          <a:p>
+            <a:pPr algn="ctr"/>
+            <a:r>
+              <a:rPr lang="en-US" altLang="zh-CN" dirty="0" smtClean="0"/>
+              <a:t>$Proxy0</a:t>
+            </a:r>
+            <a:r>
+              <a:rPr lang="zh-CN" altLang="en-US" dirty="0" smtClean="0"/>
+              <a:t>对象</a:t>
+            </a:r>
+            <a:endParaRPr lang="zh-CN" altLang="en-US" dirty="0"/>
+          </a:p>
+        </p:txBody>
+      </p:sp>
+      <p:sp>
+        <p:nvSpPr>
+          <p:cNvPr id="7" name="圆角矩形 6"/>
+          <p:cNvSpPr/>
+          <p:nvPr/>
+        </p:nvSpPr>
+        <p:spPr>
+          <a:xfrm>
+            <a:off x="2590801" y="5654845"/>
+            <a:ext cx="2053388" cy="794084"/>
+          </a:xfrm>
+          <a:prstGeom prst="roundRect">
+            <a:avLst/>
+          </a:prstGeom>
+        </p:spPr>
+        <p:style>
+          <a:lnRef idx="2">
+            <a:schemeClr val="accent2">
+              <a:shade val="50000"/>
+            </a:schemeClr>
+          </a:lnRef>
+          <a:fillRef idx="1">
+            <a:schemeClr val="accent2"/>
+          </a:fillRef>
+          <a:effectRef idx="0">
+            <a:schemeClr val="accent2"/>
+          </a:effectRef>
+          <a:fontRef idx="minor">
+            <a:schemeClr val="lt1"/>
+          </a:fontRef>
+        </p:style>
+        <p:txBody>
+          <a:bodyPr rtlCol="0" anchor="ctr"/>
+          <a:lstStyle/>
+          <a:p>
+            <a:pPr algn="ctr"/>
+            <a:r>
+              <a:rPr lang="en-US" altLang="zh-CN" dirty="0" smtClean="0"/>
+              <a:t>ProxyGenerator</a:t>
+            </a:r>
+          </a:p>
+          <a:p>
+            <a:pPr algn="ctr"/>
+            <a:r>
+              <a:rPr lang="en-US" altLang="zh-CN" dirty="0" smtClean="0"/>
+              <a:t>.generateProxyClass()</a:t>
+            </a:r>
+            <a:endParaRPr lang="zh-CN" altLang="en-US" dirty="0"/>
+          </a:p>
+        </p:txBody>
+      </p:sp>
+      <p:sp>
+        <p:nvSpPr>
+          <p:cNvPr id="9" name="圆角矩形 8"/>
+          <p:cNvSpPr/>
+          <p:nvPr/>
+        </p:nvSpPr>
+        <p:spPr>
+          <a:xfrm>
+            <a:off x="2590801" y="1509965"/>
+            <a:ext cx="2053388" cy="794084"/>
+          </a:xfrm>
+          <a:prstGeom prst="roundRect">
+            <a:avLst/>
+          </a:prstGeom>
+        </p:spPr>
+        <p:style>
+          <a:lnRef idx="2">
+            <a:schemeClr val="accent2">
+              <a:shade val="50000"/>
+            </a:schemeClr>
+          </a:lnRef>
+          <a:fillRef idx="1">
+            <a:schemeClr val="accent2"/>
+          </a:fillRef>
+          <a:effectRef idx="0">
+            <a:schemeClr val="accent2"/>
+          </a:effectRef>
+          <a:fontRef idx="minor">
+            <a:schemeClr val="lt1"/>
+          </a:fontRef>
+        </p:style>
+        <p:txBody>
+          <a:bodyPr rtlCol="0" anchor="ctr"/>
+          <a:lstStyle/>
+          <a:p>
+            <a:pPr algn="ctr"/>
+            <a:r>
+              <a:rPr lang="en-US" altLang="zh-CN" dirty="0" smtClean="0"/>
+              <a:t>Class&lt;?&gt; = getProxyClass0()</a:t>
+            </a:r>
+            <a:endParaRPr lang="zh-CN" altLang="en-US" dirty="0"/>
+          </a:p>
+        </p:txBody>
+      </p:sp>
+      <p:sp>
+        <p:nvSpPr>
+          <p:cNvPr id="11" name="圆角矩形 10"/>
+          <p:cNvSpPr/>
+          <p:nvPr/>
+        </p:nvSpPr>
+        <p:spPr>
+          <a:xfrm>
+            <a:off x="433139" y="4660232"/>
+            <a:ext cx="2053389" cy="794084"/>
+          </a:xfrm>
+          <a:prstGeom prst="roundRect">
+            <a:avLst/>
+          </a:prstGeom>
+        </p:spPr>
+        <p:style>
+          <a:lnRef idx="2">
+            <a:schemeClr val="accent1">
+              <a:shade val="50000"/>
+            </a:schemeClr>
+          </a:lnRef>
+          <a:fillRef idx="1">
+            <a:schemeClr val="accent1"/>
+          </a:fillRef>
+          <a:effectRef idx="0">
+            <a:schemeClr val="accent1"/>
+          </a:effectRef>
+          <a:fontRef idx="minor">
+            <a:schemeClr val="lt1"/>
+          </a:fontRef>
+        </p:style>
+        <p:txBody>
+          <a:bodyPr rtlCol="0" anchor="ctr"/>
+          <a:lstStyle/>
+          <a:p>
+            <a:pPr algn="ctr"/>
+            <a:r>
+              <a:rPr lang="en-US" altLang="zh-CN" dirty="0" smtClean="0"/>
+              <a:t>byte[] </a:t>
+            </a:r>
+            <a:r>
+              <a:rPr lang="en-US" altLang="zh-CN" dirty="0" err="1" smtClean="0"/>
+              <a:t>proxyClassFile</a:t>
+            </a:r>
+            <a:endParaRPr lang="zh-CN" altLang="en-US" dirty="0"/>
+          </a:p>
+        </p:txBody>
+      </p:sp>
+      <p:sp>
+        <p:nvSpPr>
+          <p:cNvPr id="18" name="圆角矩形 17"/>
+          <p:cNvSpPr/>
+          <p:nvPr/>
+        </p:nvSpPr>
+        <p:spPr>
+          <a:xfrm>
+            <a:off x="2590801" y="4098760"/>
+            <a:ext cx="2053388" cy="794084"/>
+          </a:xfrm>
+          <a:prstGeom prst="roundRect">
+            <a:avLst/>
+          </a:prstGeom>
+        </p:spPr>
+        <p:style>
+          <a:lnRef idx="2">
+            <a:schemeClr val="accent2">
+              <a:shade val="50000"/>
+            </a:schemeClr>
+          </a:lnRef>
+          <a:fillRef idx="1">
+            <a:schemeClr val="accent2"/>
+          </a:fillRef>
+          <a:effectRef idx="0">
+            <a:schemeClr val="accent2"/>
+          </a:effectRef>
+          <a:fontRef idx="minor">
+            <a:schemeClr val="lt1"/>
+          </a:fontRef>
+        </p:style>
+        <p:txBody>
+          <a:bodyPr rtlCol="0" anchor="ctr"/>
+          <a:lstStyle/>
+          <a:p>
+            <a:pPr algn="ctr"/>
+            <a:r>
+              <a:rPr lang="en-US" altLang="zh-CN" dirty="0" smtClean="0"/>
+              <a:t>defineClass0()</a:t>
+            </a:r>
+            <a:endParaRPr lang="zh-CN" altLang="en-US" dirty="0"/>
+          </a:p>
+        </p:txBody>
+      </p:sp>
+      <p:sp>
+        <p:nvSpPr>
+          <p:cNvPr id="22" name="圆角矩形 21"/>
+          <p:cNvSpPr/>
+          <p:nvPr/>
+        </p:nvSpPr>
+        <p:spPr>
+          <a:xfrm>
+            <a:off x="2566739" y="2827422"/>
+            <a:ext cx="2053388" cy="794084"/>
+          </a:xfrm>
+          <a:prstGeom prst="roundRect">
+            <a:avLst/>
+          </a:prstGeom>
+        </p:spPr>
+        <p:style>
+          <a:lnRef idx="2">
+            <a:schemeClr val="accent2">
+              <a:shade val="50000"/>
+            </a:schemeClr>
+          </a:lnRef>
+          <a:fillRef idx="1">
+            <a:schemeClr val="accent2"/>
+          </a:fillRef>
+          <a:effectRef idx="0">
+            <a:schemeClr val="accent2"/>
+          </a:effectRef>
+          <a:fontRef idx="minor">
+            <a:schemeClr val="lt1"/>
+          </a:fontRef>
+        </p:style>
+        <p:txBody>
+          <a:bodyPr rtlCol="0" anchor="ctr"/>
+          <a:lstStyle/>
+          <a:p>
+            <a:pPr algn="ctr"/>
+            <a:r>
+              <a:rPr lang="en-US" altLang="zh-CN" dirty="0" smtClean="0"/>
+              <a:t>ProxyClassFactory</a:t>
+            </a:r>
+            <a:endParaRPr lang="en-US" altLang="zh-CN" dirty="0"/>
+          </a:p>
+          <a:p>
+            <a:pPr algn="ctr"/>
+            <a:r>
+              <a:rPr lang="en-US" altLang="zh-CN" dirty="0" smtClean="0"/>
+              <a:t>.apply()</a:t>
+            </a:r>
+            <a:endParaRPr lang="zh-CN" altLang="en-US" dirty="0"/>
+          </a:p>
+        </p:txBody>
+      </p:sp>
+      <p:cxnSp>
+        <p:nvCxnSpPr>
+          <p:cNvPr id="24" name="直接箭头连接符 23"/>
+          <p:cNvCxnSpPr>
+            <a:stCxn id="4" idx="3"/>
+            <a:endCxn id="6" idx="1"/>
+          </p:cNvCxnSpPr>
+          <p:nvPr/>
+        </p:nvCxnSpPr>
+        <p:spPr>
+          <a:xfrm>
+            <a:off x="8029072" y="813134"/>
+            <a:ext cx="1620254" cy="0"/>
+          </a:xfrm>
+          <a:prstGeom prst="straightConnector1">
+            <a:avLst/>
+          </a:prstGeom>
+          <a:ln>
+            <a:tailEnd type="triangle"/>
+          </a:ln>
+        </p:spPr>
+        <p:style>
+          <a:lnRef idx="1">
+            <a:schemeClr val="accent1"/>
+          </a:lnRef>
+          <a:fillRef idx="0">
+            <a:schemeClr val="accent1"/>
+          </a:fillRef>
+          <a:effectRef idx="0">
+            <a:schemeClr val="accent1"/>
+          </a:effectRef>
+          <a:fontRef idx="minor">
+            <a:schemeClr val="tx1"/>
+          </a:fontRef>
+        </p:style>
+      </p:cxnSp>
+      <p:cxnSp>
+        <p:nvCxnSpPr>
+          <p:cNvPr id="29" name="直接箭头连接符 28"/>
+          <p:cNvCxnSpPr>
+            <a:stCxn id="5" idx="3"/>
+            <a:endCxn id="4" idx="1"/>
+          </p:cNvCxnSpPr>
+          <p:nvPr/>
+        </p:nvCxnSpPr>
+        <p:spPr>
+          <a:xfrm>
+            <a:off x="4652210" y="794083"/>
+            <a:ext cx="1323473" cy="19051"/>
+          </a:xfrm>
+          <a:prstGeom prst="straightConnector1">
+            <a:avLst/>
+          </a:prstGeom>
+          <a:ln>
+            <a:tailEnd type="triangle"/>
+          </a:ln>
+        </p:spPr>
+        <p:style>
+          <a:lnRef idx="1">
+            <a:schemeClr val="accent1"/>
+          </a:lnRef>
+          <a:fillRef idx="0">
+            <a:schemeClr val="accent1"/>
+          </a:fillRef>
+          <a:effectRef idx="0">
+            <a:schemeClr val="accent1"/>
+          </a:effectRef>
+          <a:fontRef idx="minor">
+            <a:schemeClr val="tx1"/>
+          </a:fontRef>
+        </p:style>
+      </p:cxnSp>
+      <p:cxnSp>
+        <p:nvCxnSpPr>
+          <p:cNvPr id="50" name="直接箭头连接符 49"/>
+          <p:cNvCxnSpPr>
+            <a:stCxn id="22" idx="0"/>
+            <a:endCxn id="9" idx="2"/>
+          </p:cNvCxnSpPr>
+          <p:nvPr/>
+        </p:nvCxnSpPr>
+        <p:spPr>
+          <a:xfrm flipV="1">
+            <a:off x="3593433" y="2304049"/>
+            <a:ext cx="24062" cy="523373"/>
+          </a:xfrm>
+          <a:prstGeom prst="straightConnector1">
+            <a:avLst/>
+          </a:prstGeom>
+          <a:ln>
+            <a:tailEnd type="triangle"/>
+          </a:ln>
+        </p:spPr>
+        <p:style>
+          <a:lnRef idx="1">
+            <a:schemeClr val="accent1"/>
+          </a:lnRef>
+          <a:fillRef idx="0">
+            <a:schemeClr val="accent1"/>
+          </a:fillRef>
+          <a:effectRef idx="0">
+            <a:schemeClr val="accent1"/>
+          </a:effectRef>
+          <a:fontRef idx="minor">
+            <a:schemeClr val="tx1"/>
+          </a:fontRef>
+        </p:style>
+      </p:cxnSp>
+      <p:cxnSp>
+        <p:nvCxnSpPr>
+          <p:cNvPr id="57" name="直接箭头连接符 56"/>
+          <p:cNvCxnSpPr>
+            <a:stCxn id="7" idx="0"/>
+            <a:endCxn id="18" idx="2"/>
+          </p:cNvCxnSpPr>
+          <p:nvPr/>
+        </p:nvCxnSpPr>
+        <p:spPr>
+          <a:xfrm flipV="1">
+            <a:off x="3617495" y="4892844"/>
+            <a:ext cx="0" cy="762001"/>
+          </a:xfrm>
+          <a:prstGeom prst="straightConnector1">
+            <a:avLst/>
+          </a:prstGeom>
+          <a:ln>
+            <a:tailEnd type="triangle"/>
+          </a:ln>
+        </p:spPr>
+        <p:style>
+          <a:lnRef idx="1">
+            <a:schemeClr val="accent1"/>
+          </a:lnRef>
+          <a:fillRef idx="0">
+            <a:schemeClr val="accent1"/>
+          </a:fillRef>
+          <a:effectRef idx="0">
+            <a:schemeClr val="accent1"/>
+          </a:effectRef>
+          <a:fontRef idx="minor">
+            <a:schemeClr val="tx1"/>
+          </a:fontRef>
+        </p:style>
+      </p:cxnSp>
+      <p:cxnSp>
+        <p:nvCxnSpPr>
+          <p:cNvPr id="63" name="直接箭头连接符 62"/>
+          <p:cNvCxnSpPr>
+            <a:stCxn id="18" idx="0"/>
+            <a:endCxn id="22" idx="2"/>
+          </p:cNvCxnSpPr>
+          <p:nvPr/>
+        </p:nvCxnSpPr>
+        <p:spPr>
+          <a:xfrm flipH="1" flipV="1">
+            <a:off x="3593433" y="3621506"/>
+            <a:ext cx="24062" cy="477254"/>
+          </a:xfrm>
+          <a:prstGeom prst="straightConnector1">
+            <a:avLst/>
+          </a:prstGeom>
+          <a:ln>
+            <a:tailEnd type="triangle"/>
+          </a:ln>
+        </p:spPr>
+        <p:style>
+          <a:lnRef idx="1">
+            <a:schemeClr val="accent1"/>
+          </a:lnRef>
+          <a:fillRef idx="0">
+            <a:schemeClr val="accent1"/>
+          </a:fillRef>
+          <a:effectRef idx="0">
+            <a:schemeClr val="accent1"/>
+          </a:effectRef>
+          <a:fontRef idx="minor">
+            <a:schemeClr val="tx1"/>
+          </a:fontRef>
+        </p:style>
+      </p:cxnSp>
+      <p:sp>
+        <p:nvSpPr>
+          <p:cNvPr id="72" name="圆角矩形 71"/>
+          <p:cNvSpPr/>
+          <p:nvPr/>
+        </p:nvSpPr>
+        <p:spPr>
+          <a:xfrm>
+            <a:off x="4948989" y="3366837"/>
+            <a:ext cx="2053389" cy="794084"/>
+          </a:xfrm>
+          <a:prstGeom prst="roundRect">
+            <a:avLst/>
+          </a:prstGeom>
+        </p:spPr>
+        <p:style>
+          <a:lnRef idx="2">
+            <a:schemeClr val="accent1">
+              <a:shade val="50000"/>
+            </a:schemeClr>
+          </a:lnRef>
+          <a:fillRef idx="1">
+            <a:schemeClr val="accent1"/>
+          </a:fillRef>
+          <a:effectRef idx="0">
+            <a:schemeClr val="accent1"/>
+          </a:effectRef>
+          <a:fontRef idx="minor">
+            <a:schemeClr val="lt1"/>
+          </a:fontRef>
+        </p:style>
+        <p:txBody>
+          <a:bodyPr rtlCol="0" anchor="ctr"/>
+          <a:lstStyle/>
+          <a:p>
+            <a:pPr algn="ctr"/>
+            <a:r>
+              <a:rPr lang="en-US" altLang="zh-CN" dirty="0" smtClean="0"/>
+              <a:t>Class&lt;?&gt; cl</a:t>
+            </a:r>
+            <a:endParaRPr lang="zh-CN" altLang="en-US" dirty="0"/>
+          </a:p>
+        </p:txBody>
+      </p:sp>
+      <p:sp>
+        <p:nvSpPr>
+          <p:cNvPr id="73" name="圆角矩形 72"/>
+          <p:cNvSpPr/>
+          <p:nvPr/>
+        </p:nvSpPr>
+        <p:spPr>
+          <a:xfrm>
+            <a:off x="4920917" y="2168693"/>
+            <a:ext cx="2053389" cy="794084"/>
+          </a:xfrm>
+          <a:prstGeom prst="roundRect">
+            <a:avLst/>
+          </a:prstGeom>
+        </p:spPr>
+        <p:style>
+          <a:lnRef idx="2">
+            <a:schemeClr val="accent1">
+              <a:shade val="50000"/>
+            </a:schemeClr>
+          </a:lnRef>
+          <a:fillRef idx="1">
+            <a:schemeClr val="accent1"/>
+          </a:fillRef>
+          <a:effectRef idx="0">
+            <a:schemeClr val="accent1"/>
+          </a:effectRef>
+          <a:fontRef idx="minor">
+            <a:schemeClr val="lt1"/>
+          </a:fontRef>
+        </p:style>
+        <p:txBody>
+          <a:bodyPr rtlCol="0" anchor="ctr"/>
+          <a:lstStyle/>
+          <a:p>
+            <a:pPr algn="ctr"/>
+            <a:r>
+              <a:rPr lang="en-US" altLang="zh-CN" dirty="0" smtClean="0"/>
+              <a:t>Class&lt;?&gt; cl</a:t>
+            </a:r>
+            <a:endParaRPr lang="zh-CN" altLang="en-US" dirty="0"/>
+          </a:p>
+        </p:txBody>
+      </p:sp>
+      <p:cxnSp>
+        <p:nvCxnSpPr>
+          <p:cNvPr id="75" name="直接箭头连接符 74"/>
+          <p:cNvCxnSpPr>
+            <a:stCxn id="9" idx="0"/>
+            <a:endCxn id="5" idx="2"/>
+          </p:cNvCxnSpPr>
+          <p:nvPr/>
+        </p:nvCxnSpPr>
+        <p:spPr>
+          <a:xfrm flipV="1">
+            <a:off x="3617495" y="1191125"/>
+            <a:ext cx="8021" cy="318840"/>
+          </a:xfrm>
+          <a:prstGeom prst="straightConnector1">
+            <a:avLst/>
+          </a:prstGeom>
+          <a:ln>
+            <a:tailEnd type="triangle"/>
+          </a:ln>
+        </p:spPr>
+        <p:style>
+          <a:lnRef idx="1">
+            <a:schemeClr val="accent1"/>
+          </a:lnRef>
+          <a:fillRef idx="0">
+            <a:schemeClr val="accent1"/>
+          </a:fillRef>
+          <a:effectRef idx="0">
+            <a:schemeClr val="accent1"/>
+          </a:effectRef>
+          <a:fontRef idx="minor">
+            <a:schemeClr val="tx1"/>
+          </a:fontRef>
+        </p:style>
+      </p:cxnSp>
+      <p:sp>
+        <p:nvSpPr>
+          <p:cNvPr id="79" name="矩形 78"/>
+          <p:cNvSpPr/>
+          <p:nvPr/>
+        </p:nvSpPr>
+        <p:spPr>
+          <a:xfrm>
+            <a:off x="2494548" y="5454316"/>
+            <a:ext cx="2253915" cy="1402682"/>
+          </a:xfrm>
+          <a:prstGeom prst="rect">
+            <a:avLst/>
+          </a:prstGeom>
+          <a:noFill/>
+          <a:ln w="57150">
+            <a:solidFill>
+              <a:srgbClr val="92D050"/>
+            </a:solidFill>
+          </a:ln>
+        </p:spPr>
+        <p:style>
+          <a:lnRef idx="2">
+            <a:schemeClr val="accent1">
+              <a:shade val="50000"/>
+            </a:schemeClr>
+          </a:lnRef>
+          <a:fillRef idx="1">
+            <a:schemeClr val="accent1"/>
+          </a:fillRef>
+          <a:effectRef idx="0">
+            <a:schemeClr val="accent1"/>
+          </a:effectRef>
+          <a:fontRef idx="minor">
+            <a:schemeClr val="lt1"/>
+          </a:fontRef>
+        </p:style>
+        <p:txBody>
+          <a:bodyPr rtlCol="0" anchor="ctr"/>
+          <a:lstStyle/>
+          <a:p>
+            <a:pPr algn="ctr"/>
+            <a:endParaRPr lang="zh-CN" altLang="en-US"/>
+          </a:p>
+        </p:txBody>
+      </p:sp>
+      <p:sp>
+        <p:nvSpPr>
+          <p:cNvPr id="80" name="矩形 79"/>
+          <p:cNvSpPr/>
+          <p:nvPr/>
+        </p:nvSpPr>
+        <p:spPr>
+          <a:xfrm>
+            <a:off x="2157662" y="2622889"/>
+            <a:ext cx="2662991" cy="1154526"/>
+          </a:xfrm>
+          <a:prstGeom prst="rect">
+            <a:avLst/>
+          </a:prstGeom>
+          <a:noFill/>
+          <a:ln w="57150">
+            <a:solidFill>
+              <a:srgbClr val="FF0000"/>
+            </a:solidFill>
+          </a:ln>
+        </p:spPr>
+        <p:style>
+          <a:lnRef idx="2">
+            <a:schemeClr val="accent1">
+              <a:shade val="50000"/>
+            </a:schemeClr>
+          </a:lnRef>
+          <a:fillRef idx="1">
+            <a:schemeClr val="accent1"/>
+          </a:fillRef>
+          <a:effectRef idx="0">
+            <a:schemeClr val="accent1"/>
+          </a:effectRef>
+          <a:fontRef idx="minor">
+            <a:schemeClr val="lt1"/>
+          </a:fontRef>
+        </p:style>
+        <p:txBody>
+          <a:bodyPr rtlCol="0" anchor="ctr"/>
+          <a:lstStyle/>
+          <a:p>
+            <a:pPr algn="ctr"/>
+            <a:endParaRPr lang="zh-CN" altLang="en-US"/>
+          </a:p>
+        </p:txBody>
+      </p:sp>
+    </p:spTree>
+    <p:extLst>
+      <p:ext uri="{BB962C8B-B14F-4D97-AF65-F5344CB8AC3E}">
+        <p14:creationId xmlns:p14="http://schemas.microsoft.com/office/powerpoint/2010/main" val="974033400"/>
+      </p:ext>
+    </p:extLst>
+  </p:cSld>
+  <p:clrMapOvr>
+    <a:masterClrMapping/>
+  </p:clrMapOvr>
+  <p:timing>
+    <p:tnLst>
+      <p:par>
+        <p:cTn id="1" dur="indefinite" restart="never" nodeType="tmRoot"/>
+      </p:par>
+    </p:tnLst>
+  </p:timing>
+</p:sld>
+</file>
+
+<file path=ppt/slides/slide8.xml><?xml version="1.0" encoding="utf-8"?>
+<p:sld xmlns:a="http://schemas.openxmlformats.org/drawingml/2006/main" xmlns:r="http://schemas.openxmlformats.org/officeDocument/2006/relationships" xmlns:p="http://schemas.openxmlformats.org/presentationml/2006/main">
+  <p:cSld>
+    <p:spTree>
+      <p:nvGrpSpPr>
+        <p:cNvPr id="1" name=""/>
+        <p:cNvGrpSpPr/>
+        <p:nvPr/>
+      </p:nvGrpSpPr>
+      <p:grpSpPr>
+        <a:xfrm>
+          <a:off x="0" y="0"/>
+          <a:ext cx="0" cy="0"/>
+          <a:chOff x="0" y="0"/>
+          <a:chExt cx="0" cy="0"/>
+        </a:xfrm>
+      </p:grpSpPr>
+      <p:sp>
+        <p:nvSpPr>
           <p:cNvPr id="2" name="圆角矩形 1"/>
           <p:cNvSpPr/>
           <p:nvPr/>
@@ -8005,7 +11026,7 @@
 </p:sld>
 </file>
 
-<file path=ppt/slides/slide6.xml><?xml version="1.0" encoding="utf-8"?>
+<file path=ppt/slides/slide9.xml><?xml version="1.0" encoding="utf-8"?>
 <p:sld xmlns:a="http://schemas.openxmlformats.org/drawingml/2006/main" xmlns:r="http://schemas.openxmlformats.org/officeDocument/2006/relationships" xmlns:p="http://schemas.openxmlformats.org/presentationml/2006/main">
   <p:cSld>
     <p:spTree>

</xml_diff>